<commit_message>
Update SQL Functions and GROUP BY.pptx
</commit_message>
<xml_diff>
--- a/07 - Introduction to SQL/SQL Functions and GROUP BY.pptx
+++ b/07 - Introduction to SQL/SQL Functions and GROUP BY.pptx
@@ -5,25 +5,27 @@
     <p:sldMasterId id="2147483648" r:id="rId1"/>
   </p:sldMasterIdLst>
   <p:notesMasterIdLst>
-    <p:notesMasterId r:id="rId18"/>
+    <p:notesMasterId r:id="rId20"/>
   </p:notesMasterIdLst>
   <p:sldIdLst>
     <p:sldId id="257" r:id="rId2"/>
     <p:sldId id="263" r:id="rId3"/>
     <p:sldId id="268" r:id="rId4"/>
-    <p:sldId id="271" r:id="rId5"/>
-    <p:sldId id="273" r:id="rId6"/>
-    <p:sldId id="274" r:id="rId7"/>
-    <p:sldId id="275" r:id="rId8"/>
-    <p:sldId id="276" r:id="rId9"/>
-    <p:sldId id="277" r:id="rId10"/>
-    <p:sldId id="272" r:id="rId11"/>
-    <p:sldId id="278" r:id="rId12"/>
-    <p:sldId id="279" r:id="rId13"/>
-    <p:sldId id="280" r:id="rId14"/>
-    <p:sldId id="281" r:id="rId15"/>
-    <p:sldId id="282" r:id="rId16"/>
-    <p:sldId id="283" r:id="rId17"/>
+    <p:sldId id="284" r:id="rId5"/>
+    <p:sldId id="271" r:id="rId6"/>
+    <p:sldId id="273" r:id="rId7"/>
+    <p:sldId id="274" r:id="rId8"/>
+    <p:sldId id="275" r:id="rId9"/>
+    <p:sldId id="276" r:id="rId10"/>
+    <p:sldId id="277" r:id="rId11"/>
+    <p:sldId id="285" r:id="rId12"/>
+    <p:sldId id="272" r:id="rId13"/>
+    <p:sldId id="278" r:id="rId14"/>
+    <p:sldId id="279" r:id="rId15"/>
+    <p:sldId id="280" r:id="rId16"/>
+    <p:sldId id="281" r:id="rId17"/>
+    <p:sldId id="282" r:id="rId18"/>
+    <p:sldId id="283" r:id="rId19"/>
   </p:sldIdLst>
   <p:sldSz cx="12192000" cy="6858000"/>
   <p:notesSz cx="6858000" cy="9144000"/>
@@ -3571,7 +3573,7 @@
           <a:p>
             <a:fld id="{75A99358-0554-3345-871D-48A6BABEE3E1}" type="datetimeFigureOut">
               <a:rPr lang="en-US" smtClean="0"/>
-              <a:t>2/25/2025</a:t>
+              <a:t>2/26/2025</a:t>
             </a:fld>
             <a:endParaRPr lang="en-US"/>
           </a:p>
@@ -4098,7 +4100,7 @@
           <a:p>
             <a:fld id="{04BC266F-70C8-954B-9EC8-D842168CE9D2}" type="datetimeFigureOut">
               <a:rPr lang="en-US" smtClean="0"/>
-              <a:t>2/25/2025</a:t>
+              <a:t>2/26/2025</a:t>
             </a:fld>
             <a:endParaRPr lang="en-US"/>
           </a:p>
@@ -6047,7 +6049,7 @@
           <a:p>
             <a:fld id="{04BC266F-70C8-954B-9EC8-D842168CE9D2}" type="datetimeFigureOut">
               <a:rPr lang="en-US" smtClean="0"/>
-              <a:t>2/25/2025</a:t>
+              <a:t>2/26/2025</a:t>
             </a:fld>
             <a:endParaRPr lang="en-US"/>
           </a:p>
@@ -7705,7 +7707,7 @@
           <a:p>
             <a:fld id="{04BC266F-70C8-954B-9EC8-D842168CE9D2}" type="datetimeFigureOut">
               <a:rPr lang="en-US" smtClean="0"/>
-              <a:t>2/25/2025</a:t>
+              <a:t>2/26/2025</a:t>
             </a:fld>
             <a:endParaRPr lang="en-US"/>
           </a:p>
@@ -8150,7 +8152,7 @@
           <a:p>
             <a:fld id="{04BC266F-70C8-954B-9EC8-D842168CE9D2}" type="datetimeFigureOut">
               <a:rPr lang="en-US" smtClean="0"/>
-              <a:t>2/25/2025</a:t>
+              <a:t>2/26/2025</a:t>
             </a:fld>
             <a:endParaRPr lang="en-US"/>
           </a:p>
@@ -9820,7 +9822,7 @@
           <a:p>
             <a:fld id="{04BC266F-70C8-954B-9EC8-D842168CE9D2}" type="datetimeFigureOut">
               <a:rPr lang="en-US" smtClean="0"/>
-              <a:t>2/25/2025</a:t>
+              <a:t>2/26/2025</a:t>
             </a:fld>
             <a:endParaRPr lang="en-US"/>
           </a:p>
@@ -10331,6 +10333,1477 @@
         <p:cNvPr id="1" name="">
           <a:extLst>
             <a:ext uri="{FF2B5EF4-FFF2-40B4-BE49-F238E27FC236}">
+              <a16:creationId xmlns:a16="http://schemas.microsoft.com/office/drawing/2014/main" id="{6B4B3633-837D-3F67-9A97-B068931CD29C}"/>
+            </a:ext>
+          </a:extLst>
+        </p:cNvPr>
+        <p:cNvGrpSpPr/>
+        <p:nvPr/>
+      </p:nvGrpSpPr>
+      <p:grpSpPr>
+        <a:xfrm>
+          <a:off x="0" y="0"/>
+          <a:ext cx="0" cy="0"/>
+          <a:chOff x="0" y="0"/>
+          <a:chExt cx="0" cy="0"/>
+        </a:xfrm>
+      </p:grpSpPr>
+      <p:graphicFrame>
+        <p:nvGraphicFramePr>
+          <p:cNvPr id="23" name="Table 22">
+            <a:extLst>
+              <a:ext uri="{FF2B5EF4-FFF2-40B4-BE49-F238E27FC236}">
+                <a16:creationId xmlns:a16="http://schemas.microsoft.com/office/drawing/2014/main" id="{4FEA5446-6A84-73EF-4583-897A2A274B93}"/>
+              </a:ext>
+            </a:extLst>
+          </p:cNvPr>
+          <p:cNvGraphicFramePr>
+            <a:graphicFrameLocks noGrp="1"/>
+          </p:cNvGraphicFramePr>
+          <p:nvPr/>
+        </p:nvGraphicFramePr>
+        <p:xfrm>
+          <a:off x="247286" y="283616"/>
+          <a:ext cx="5748320" cy="3046110"/>
+        </p:xfrm>
+        <a:graphic>
+          <a:graphicData uri="http://schemas.openxmlformats.org/drawingml/2006/table">
+            <a:tbl>
+              <a:tblPr firstRow="1" bandRow="1">
+                <a:tableStyleId>{5940675A-B579-460E-94D1-54222C63F5DA}</a:tableStyleId>
+              </a:tblPr>
+              <a:tblGrid>
+                <a:gridCol w="1437080">
+                  <a:extLst>
+                    <a:ext uri="{9D8B030D-6E8A-4147-A177-3AD203B41FA5}">
+                      <a16:colId xmlns:a16="http://schemas.microsoft.com/office/drawing/2014/main" val="3058387547"/>
+                    </a:ext>
+                  </a:extLst>
+                </a:gridCol>
+                <a:gridCol w="1437080">
+                  <a:extLst>
+                    <a:ext uri="{9D8B030D-6E8A-4147-A177-3AD203B41FA5}">
+                      <a16:colId xmlns:a16="http://schemas.microsoft.com/office/drawing/2014/main" val="4203511651"/>
+                    </a:ext>
+                  </a:extLst>
+                </a:gridCol>
+                <a:gridCol w="1437080">
+                  <a:extLst>
+                    <a:ext uri="{9D8B030D-6E8A-4147-A177-3AD203B41FA5}">
+                      <a16:colId xmlns:a16="http://schemas.microsoft.com/office/drawing/2014/main" val="1098043855"/>
+                    </a:ext>
+                  </a:extLst>
+                </a:gridCol>
+                <a:gridCol w="1437080">
+                  <a:extLst>
+                    <a:ext uri="{9D8B030D-6E8A-4147-A177-3AD203B41FA5}">
+                      <a16:colId xmlns:a16="http://schemas.microsoft.com/office/drawing/2014/main" val="1582278893"/>
+                    </a:ext>
+                  </a:extLst>
+                </a:gridCol>
+              </a:tblGrid>
+              <a:tr h="373155">
+                <a:tc gridSpan="4">
+                  <a:txBody>
+                    <a:bodyPr/>
+                    <a:lstStyle/>
+                    <a:p>
+                      <a:pPr marL="0" marR="0" lvl="0" indent="0" algn="ctr" defTabSz="914400" rtl="0" eaLnBrk="1" fontAlgn="auto" latinLnBrk="0" hangingPunct="1">
+                        <a:lnSpc>
+                          <a:spcPct val="100000"/>
+                        </a:lnSpc>
+                        <a:spcBef>
+                          <a:spcPts val="0"/>
+                        </a:spcBef>
+                        <a:spcAft>
+                          <a:spcPts val="0"/>
+                        </a:spcAft>
+                        <a:buClrTx/>
+                        <a:buSzTx/>
+                        <a:buFontTx/>
+                        <a:buNone/>
+                        <a:tabLst/>
+                        <a:defRPr/>
+                      </a:pPr>
+                      <a:r>
+                        <a:rPr lang="en-PH" sz="1500" b="1" dirty="0"/>
+                        <a:t>transactions</a:t>
+                      </a:r>
+                    </a:p>
+                  </a:txBody>
+                  <a:tcPr anchor="ctr">
+                    <a:solidFill>
+                      <a:srgbClr val="9999FF"/>
+                    </a:solidFill>
+                  </a:tcPr>
+                </a:tc>
+                <a:tc hMerge="1">
+                  <a:txBody>
+                    <a:bodyPr/>
+                    <a:lstStyle/>
+                    <a:p>
+                      <a:pPr algn="ctr"/>
+                      <a:endParaRPr lang="en-PH" sz="1500" b="1" dirty="0"/>
+                    </a:p>
+                  </a:txBody>
+                  <a:tcPr anchor="ctr">
+                    <a:solidFill>
+                      <a:schemeClr val="accent4">
+                        <a:lumMod val="40000"/>
+                        <a:lumOff val="60000"/>
+                      </a:schemeClr>
+                    </a:solidFill>
+                  </a:tcPr>
+                </a:tc>
+                <a:tc hMerge="1">
+                  <a:txBody>
+                    <a:bodyPr/>
+                    <a:lstStyle/>
+                    <a:p>
+                      <a:pPr algn="ctr"/>
+                      <a:endParaRPr lang="en-PH" sz="1500" b="1" dirty="0"/>
+                    </a:p>
+                  </a:txBody>
+                  <a:tcPr anchor="ctr">
+                    <a:solidFill>
+                      <a:schemeClr val="accent4">
+                        <a:lumMod val="40000"/>
+                        <a:lumOff val="60000"/>
+                      </a:schemeClr>
+                    </a:solidFill>
+                  </a:tcPr>
+                </a:tc>
+                <a:tc hMerge="1">
+                  <a:txBody>
+                    <a:bodyPr/>
+                    <a:lstStyle/>
+                    <a:p>
+                      <a:pPr marL="0" marR="0" lvl="0" indent="0" algn="ctr" defTabSz="914400" rtl="0" eaLnBrk="1" fontAlgn="auto" latinLnBrk="0" hangingPunct="1">
+                        <a:lnSpc>
+                          <a:spcPct val="100000"/>
+                        </a:lnSpc>
+                        <a:spcBef>
+                          <a:spcPts val="0"/>
+                        </a:spcBef>
+                        <a:spcAft>
+                          <a:spcPts val="0"/>
+                        </a:spcAft>
+                        <a:buClrTx/>
+                        <a:buSzTx/>
+                        <a:buFontTx/>
+                        <a:buNone/>
+                        <a:tabLst/>
+                        <a:defRPr/>
+                      </a:pPr>
+                      <a:endParaRPr lang="en-PH" sz="1500" b="1" dirty="0"/>
+                    </a:p>
+                  </a:txBody>
+                  <a:tcPr anchor="ctr">
+                    <a:solidFill>
+                      <a:srgbClr val="9999FF"/>
+                    </a:solidFill>
+                  </a:tcPr>
+                </a:tc>
+                <a:extLst>
+                  <a:ext uri="{0D108BD9-81ED-4DB2-BD59-A6C34878D82A}">
+                    <a16:rowId xmlns:a16="http://schemas.microsoft.com/office/drawing/2014/main" val="1755305712"/>
+                  </a:ext>
+                </a:extLst>
+              </a:tr>
+              <a:tr h="373155">
+                <a:tc>
+                  <a:txBody>
+                    <a:bodyPr/>
+                    <a:lstStyle/>
+                    <a:p>
+                      <a:pPr marL="0" marR="0" lvl="0" indent="0" algn="ctr" defTabSz="914400" rtl="0" eaLnBrk="1" fontAlgn="auto" latinLnBrk="0" hangingPunct="1">
+                        <a:lnSpc>
+                          <a:spcPct val="100000"/>
+                        </a:lnSpc>
+                        <a:spcBef>
+                          <a:spcPts val="0"/>
+                        </a:spcBef>
+                        <a:spcAft>
+                          <a:spcPts val="0"/>
+                        </a:spcAft>
+                        <a:buClrTx/>
+                        <a:buSzTx/>
+                        <a:buFontTx/>
+                        <a:buNone/>
+                        <a:tabLst/>
+                        <a:defRPr/>
+                      </a:pPr>
+                      <a:r>
+                        <a:rPr lang="en-PH" sz="1500" b="1" dirty="0" err="1"/>
+                        <a:t>transaction_id</a:t>
+                      </a:r>
+                      <a:endParaRPr lang="en-PH" sz="1500" b="1" dirty="0"/>
+                    </a:p>
+                  </a:txBody>
+                  <a:tcPr anchor="ctr">
+                    <a:solidFill>
+                      <a:schemeClr val="accent4">
+                        <a:lumMod val="40000"/>
+                        <a:lumOff val="60000"/>
+                      </a:schemeClr>
+                    </a:solidFill>
+                  </a:tcPr>
+                </a:tc>
+                <a:tc>
+                  <a:txBody>
+                    <a:bodyPr/>
+                    <a:lstStyle/>
+                    <a:p>
+                      <a:pPr algn="ctr"/>
+                      <a:r>
+                        <a:rPr lang="en-PH" sz="1500" b="1" dirty="0"/>
+                        <a:t>amount</a:t>
+                      </a:r>
+                    </a:p>
+                  </a:txBody>
+                  <a:tcPr anchor="ctr">
+                    <a:solidFill>
+                      <a:schemeClr val="accent4">
+                        <a:lumMod val="40000"/>
+                        <a:lumOff val="60000"/>
+                      </a:schemeClr>
+                    </a:solidFill>
+                  </a:tcPr>
+                </a:tc>
+                <a:tc>
+                  <a:txBody>
+                    <a:bodyPr/>
+                    <a:lstStyle/>
+                    <a:p>
+                      <a:pPr marL="0" marR="0" lvl="0" indent="0" algn="ctr" defTabSz="914400" rtl="0" eaLnBrk="1" fontAlgn="auto" latinLnBrk="0" hangingPunct="1">
+                        <a:lnSpc>
+                          <a:spcPct val="100000"/>
+                        </a:lnSpc>
+                        <a:spcBef>
+                          <a:spcPts val="0"/>
+                        </a:spcBef>
+                        <a:spcAft>
+                          <a:spcPts val="0"/>
+                        </a:spcAft>
+                        <a:buClrTx/>
+                        <a:buSzTx/>
+                        <a:buFontTx/>
+                        <a:buNone/>
+                        <a:tabLst/>
+                        <a:defRPr/>
+                      </a:pPr>
+                      <a:r>
+                        <a:rPr lang="en-PH" sz="1500" b="1" dirty="0" err="1"/>
+                        <a:t>customer_id</a:t>
+                      </a:r>
+                      <a:endParaRPr lang="en-PH" sz="1500" b="1" dirty="0"/>
+                    </a:p>
+                  </a:txBody>
+                  <a:tcPr anchor="ctr">
+                    <a:solidFill>
+                      <a:schemeClr val="accent4">
+                        <a:lumMod val="40000"/>
+                        <a:lumOff val="60000"/>
+                      </a:schemeClr>
+                    </a:solidFill>
+                  </a:tcPr>
+                </a:tc>
+                <a:tc>
+                  <a:txBody>
+                    <a:bodyPr/>
+                    <a:lstStyle/>
+                    <a:p>
+                      <a:pPr marL="0" marR="0" lvl="0" indent="0" algn="ctr" defTabSz="914400" rtl="0" eaLnBrk="1" fontAlgn="auto" latinLnBrk="0" hangingPunct="1">
+                        <a:lnSpc>
+                          <a:spcPct val="100000"/>
+                        </a:lnSpc>
+                        <a:spcBef>
+                          <a:spcPts val="0"/>
+                        </a:spcBef>
+                        <a:spcAft>
+                          <a:spcPts val="0"/>
+                        </a:spcAft>
+                        <a:buClrTx/>
+                        <a:buSzTx/>
+                        <a:buFontTx/>
+                        <a:buNone/>
+                        <a:tabLst/>
+                        <a:defRPr/>
+                      </a:pPr>
+                      <a:r>
+                        <a:rPr lang="en-PH" sz="1500" b="1" dirty="0" err="1"/>
+                        <a:t>order_date</a:t>
+                      </a:r>
+                      <a:endParaRPr lang="en-PH" sz="1500" b="1" dirty="0"/>
+                    </a:p>
+                  </a:txBody>
+                  <a:tcPr anchor="ctr">
+                    <a:solidFill>
+                      <a:schemeClr val="accent4">
+                        <a:lumMod val="40000"/>
+                        <a:lumOff val="60000"/>
+                      </a:schemeClr>
+                    </a:solidFill>
+                  </a:tcPr>
+                </a:tc>
+                <a:extLst>
+                  <a:ext uri="{0D108BD9-81ED-4DB2-BD59-A6C34878D82A}">
+                    <a16:rowId xmlns:a16="http://schemas.microsoft.com/office/drawing/2014/main" val="2556140539"/>
+                  </a:ext>
+                </a:extLst>
+              </a:tr>
+              <a:tr h="459960">
+                <a:tc>
+                  <a:txBody>
+                    <a:bodyPr/>
+                    <a:lstStyle/>
+                    <a:p>
+                      <a:pPr algn="ctr"/>
+                      <a:r>
+                        <a:rPr lang="en-PH" dirty="0"/>
+                        <a:t>1000</a:t>
+                      </a:r>
+                    </a:p>
+                  </a:txBody>
+                  <a:tcPr anchor="ctr"/>
+                </a:tc>
+                <a:tc>
+                  <a:txBody>
+                    <a:bodyPr/>
+                    <a:lstStyle/>
+                    <a:p>
+                      <a:pPr algn="ctr"/>
+                      <a:r>
+                        <a:rPr lang="en-PH" dirty="0"/>
+                        <a:t>4.99</a:t>
+                      </a:r>
+                    </a:p>
+                  </a:txBody>
+                  <a:tcPr anchor="ctr"/>
+                </a:tc>
+                <a:tc>
+                  <a:txBody>
+                    <a:bodyPr/>
+                    <a:lstStyle/>
+                    <a:p>
+                      <a:pPr algn="ctr"/>
+                      <a:r>
+                        <a:rPr lang="en-PH" dirty="0"/>
+                        <a:t>3</a:t>
+                      </a:r>
+                    </a:p>
+                  </a:txBody>
+                  <a:tcPr anchor="ctr"/>
+                </a:tc>
+                <a:tc>
+                  <a:txBody>
+                    <a:bodyPr/>
+                    <a:lstStyle/>
+                    <a:p>
+                      <a:pPr algn="ctr"/>
+                      <a:r>
+                        <a:rPr lang="en-PH" dirty="0"/>
+                        <a:t>2025-01-01</a:t>
+                      </a:r>
+                    </a:p>
+                  </a:txBody>
+                  <a:tcPr anchor="ctr"/>
+                </a:tc>
+                <a:extLst>
+                  <a:ext uri="{0D108BD9-81ED-4DB2-BD59-A6C34878D82A}">
+                    <a16:rowId xmlns:a16="http://schemas.microsoft.com/office/drawing/2014/main" val="3326491140"/>
+                  </a:ext>
+                </a:extLst>
+              </a:tr>
+              <a:tr h="459960">
+                <a:tc>
+                  <a:txBody>
+                    <a:bodyPr/>
+                    <a:lstStyle/>
+                    <a:p>
+                      <a:pPr algn="ctr"/>
+                      <a:r>
+                        <a:rPr lang="en-PH" dirty="0"/>
+                        <a:t>1001</a:t>
+                      </a:r>
+                    </a:p>
+                  </a:txBody>
+                  <a:tcPr anchor="ctr"/>
+                </a:tc>
+                <a:tc>
+                  <a:txBody>
+                    <a:bodyPr/>
+                    <a:lstStyle/>
+                    <a:p>
+                      <a:pPr algn="ctr"/>
+                      <a:r>
+                        <a:rPr lang="en-PH" dirty="0"/>
+                        <a:t>2.89</a:t>
+                      </a:r>
+                    </a:p>
+                  </a:txBody>
+                  <a:tcPr anchor="ctr"/>
+                </a:tc>
+                <a:tc>
+                  <a:txBody>
+                    <a:bodyPr/>
+                    <a:lstStyle/>
+                    <a:p>
+                      <a:pPr algn="ctr"/>
+                      <a:r>
+                        <a:rPr lang="en-PH" dirty="0"/>
+                        <a:t>2</a:t>
+                      </a:r>
+                    </a:p>
+                  </a:txBody>
+                  <a:tcPr anchor="ctr"/>
+                </a:tc>
+                <a:tc>
+                  <a:txBody>
+                    <a:bodyPr/>
+                    <a:lstStyle/>
+                    <a:p>
+                      <a:pPr marL="0" marR="0" lvl="0" indent="0" algn="ctr" defTabSz="914400" rtl="0" eaLnBrk="1" fontAlgn="auto" latinLnBrk="0" hangingPunct="1">
+                        <a:lnSpc>
+                          <a:spcPct val="100000"/>
+                        </a:lnSpc>
+                        <a:spcBef>
+                          <a:spcPts val="0"/>
+                        </a:spcBef>
+                        <a:spcAft>
+                          <a:spcPts val="0"/>
+                        </a:spcAft>
+                        <a:buClrTx/>
+                        <a:buSzTx/>
+                        <a:buFontTx/>
+                        <a:buNone/>
+                        <a:tabLst/>
+                        <a:defRPr/>
+                      </a:pPr>
+                      <a:r>
+                        <a:rPr lang="en-PH" dirty="0"/>
+                        <a:t>2025-01-01</a:t>
+                      </a:r>
+                    </a:p>
+                  </a:txBody>
+                  <a:tcPr anchor="ctr"/>
+                </a:tc>
+                <a:extLst>
+                  <a:ext uri="{0D108BD9-81ED-4DB2-BD59-A6C34878D82A}">
+                    <a16:rowId xmlns:a16="http://schemas.microsoft.com/office/drawing/2014/main" val="2648341168"/>
+                  </a:ext>
+                </a:extLst>
+              </a:tr>
+              <a:tr h="459960">
+                <a:tc>
+                  <a:txBody>
+                    <a:bodyPr/>
+                    <a:lstStyle/>
+                    <a:p>
+                      <a:pPr algn="ctr"/>
+                      <a:r>
+                        <a:rPr lang="en-PH" dirty="0"/>
+                        <a:t>1002</a:t>
+                      </a:r>
+                    </a:p>
+                  </a:txBody>
+                  <a:tcPr anchor="ctr"/>
+                </a:tc>
+                <a:tc>
+                  <a:txBody>
+                    <a:bodyPr/>
+                    <a:lstStyle/>
+                    <a:p>
+                      <a:pPr algn="ctr"/>
+                      <a:r>
+                        <a:rPr lang="en-PH" dirty="0"/>
+                        <a:t>3.38</a:t>
+                      </a:r>
+                    </a:p>
+                  </a:txBody>
+                  <a:tcPr anchor="ctr"/>
+                </a:tc>
+                <a:tc>
+                  <a:txBody>
+                    <a:bodyPr/>
+                    <a:lstStyle/>
+                    <a:p>
+                      <a:pPr algn="ctr"/>
+                      <a:r>
+                        <a:rPr lang="en-PH" dirty="0"/>
+                        <a:t>3</a:t>
+                      </a:r>
+                    </a:p>
+                  </a:txBody>
+                  <a:tcPr anchor="ctr"/>
+                </a:tc>
+                <a:tc>
+                  <a:txBody>
+                    <a:bodyPr/>
+                    <a:lstStyle/>
+                    <a:p>
+                      <a:pPr marL="0" marR="0" lvl="0" indent="0" algn="ctr" defTabSz="914400" rtl="0" eaLnBrk="1" fontAlgn="auto" latinLnBrk="0" hangingPunct="1">
+                        <a:lnSpc>
+                          <a:spcPct val="100000"/>
+                        </a:lnSpc>
+                        <a:spcBef>
+                          <a:spcPts val="0"/>
+                        </a:spcBef>
+                        <a:spcAft>
+                          <a:spcPts val="0"/>
+                        </a:spcAft>
+                        <a:buClrTx/>
+                        <a:buSzTx/>
+                        <a:buFontTx/>
+                        <a:buNone/>
+                        <a:tabLst/>
+                        <a:defRPr/>
+                      </a:pPr>
+                      <a:r>
+                        <a:rPr lang="en-PH" dirty="0"/>
+                        <a:t>2025-01-02</a:t>
+                      </a:r>
+                    </a:p>
+                  </a:txBody>
+                  <a:tcPr anchor="ctr"/>
+                </a:tc>
+                <a:extLst>
+                  <a:ext uri="{0D108BD9-81ED-4DB2-BD59-A6C34878D82A}">
+                    <a16:rowId xmlns:a16="http://schemas.microsoft.com/office/drawing/2014/main" val="1017284182"/>
+                  </a:ext>
+                </a:extLst>
+              </a:tr>
+              <a:tr h="459960">
+                <a:tc>
+                  <a:txBody>
+                    <a:bodyPr/>
+                    <a:lstStyle/>
+                    <a:p>
+                      <a:pPr algn="ctr"/>
+                      <a:r>
+                        <a:rPr lang="en-PH" dirty="0"/>
+                        <a:t>1003</a:t>
+                      </a:r>
+                    </a:p>
+                  </a:txBody>
+                  <a:tcPr anchor="ctr"/>
+                </a:tc>
+                <a:tc>
+                  <a:txBody>
+                    <a:bodyPr/>
+                    <a:lstStyle/>
+                    <a:p>
+                      <a:pPr algn="ctr"/>
+                      <a:r>
+                        <a:rPr lang="en-PH" dirty="0"/>
+                        <a:t>4.99</a:t>
+                      </a:r>
+                    </a:p>
+                  </a:txBody>
+                  <a:tcPr anchor="ctr"/>
+                </a:tc>
+                <a:tc>
+                  <a:txBody>
+                    <a:bodyPr/>
+                    <a:lstStyle/>
+                    <a:p>
+                      <a:pPr algn="ctr"/>
+                      <a:r>
+                        <a:rPr lang="en-PH" dirty="0"/>
+                        <a:t>1</a:t>
+                      </a:r>
+                    </a:p>
+                  </a:txBody>
+                  <a:tcPr anchor="ctr"/>
+                </a:tc>
+                <a:tc>
+                  <a:txBody>
+                    <a:bodyPr/>
+                    <a:lstStyle/>
+                    <a:p>
+                      <a:pPr marL="0" marR="0" lvl="0" indent="0" algn="ctr" defTabSz="914400" rtl="0" eaLnBrk="1" fontAlgn="auto" latinLnBrk="0" hangingPunct="1">
+                        <a:lnSpc>
+                          <a:spcPct val="100000"/>
+                        </a:lnSpc>
+                        <a:spcBef>
+                          <a:spcPts val="0"/>
+                        </a:spcBef>
+                        <a:spcAft>
+                          <a:spcPts val="0"/>
+                        </a:spcAft>
+                        <a:buClrTx/>
+                        <a:buSzTx/>
+                        <a:buFontTx/>
+                        <a:buNone/>
+                        <a:tabLst/>
+                        <a:defRPr/>
+                      </a:pPr>
+                      <a:r>
+                        <a:rPr lang="en-PH" dirty="0"/>
+                        <a:t>2025-01-02</a:t>
+                      </a:r>
+                    </a:p>
+                  </a:txBody>
+                  <a:tcPr anchor="ctr"/>
+                </a:tc>
+                <a:extLst>
+                  <a:ext uri="{0D108BD9-81ED-4DB2-BD59-A6C34878D82A}">
+                    <a16:rowId xmlns:a16="http://schemas.microsoft.com/office/drawing/2014/main" val="3361133543"/>
+                  </a:ext>
+                </a:extLst>
+              </a:tr>
+              <a:tr h="459960">
+                <a:tc>
+                  <a:txBody>
+                    <a:bodyPr/>
+                    <a:lstStyle/>
+                    <a:p>
+                      <a:pPr algn="ctr"/>
+                      <a:r>
+                        <a:rPr lang="en-PH" dirty="0"/>
+                        <a:t>1004</a:t>
+                      </a:r>
+                    </a:p>
+                  </a:txBody>
+                  <a:tcPr anchor="ctr"/>
+                </a:tc>
+                <a:tc>
+                  <a:txBody>
+                    <a:bodyPr/>
+                    <a:lstStyle/>
+                    <a:p>
+                      <a:pPr algn="ctr"/>
+                      <a:r>
+                        <a:rPr lang="en-PH" dirty="0"/>
+                        <a:t>1.00</a:t>
+                      </a:r>
+                    </a:p>
+                  </a:txBody>
+                  <a:tcPr anchor="ctr"/>
+                </a:tc>
+                <a:tc>
+                  <a:txBody>
+                    <a:bodyPr/>
+                    <a:lstStyle/>
+                    <a:p>
+                      <a:pPr algn="ctr"/>
+                      <a:r>
+                        <a:rPr lang="en-PH" dirty="0"/>
+                        <a:t>null</a:t>
+                      </a:r>
+                    </a:p>
+                  </a:txBody>
+                  <a:tcPr anchor="ctr"/>
+                </a:tc>
+                <a:tc>
+                  <a:txBody>
+                    <a:bodyPr/>
+                    <a:lstStyle/>
+                    <a:p>
+                      <a:pPr marL="0" marR="0" lvl="0" indent="0" algn="ctr" defTabSz="914400" rtl="0" eaLnBrk="1" fontAlgn="auto" latinLnBrk="0" hangingPunct="1">
+                        <a:lnSpc>
+                          <a:spcPct val="100000"/>
+                        </a:lnSpc>
+                        <a:spcBef>
+                          <a:spcPts val="0"/>
+                        </a:spcBef>
+                        <a:spcAft>
+                          <a:spcPts val="0"/>
+                        </a:spcAft>
+                        <a:buClrTx/>
+                        <a:buSzTx/>
+                        <a:buFontTx/>
+                        <a:buNone/>
+                        <a:tabLst/>
+                        <a:defRPr/>
+                      </a:pPr>
+                      <a:r>
+                        <a:rPr lang="en-PH" dirty="0"/>
+                        <a:t>2025-01-03</a:t>
+                      </a:r>
+                    </a:p>
+                  </a:txBody>
+                  <a:tcPr anchor="ctr"/>
+                </a:tc>
+                <a:extLst>
+                  <a:ext uri="{0D108BD9-81ED-4DB2-BD59-A6C34878D82A}">
+                    <a16:rowId xmlns:a16="http://schemas.microsoft.com/office/drawing/2014/main" val="2717289863"/>
+                  </a:ext>
+                </a:extLst>
+              </a:tr>
+            </a:tbl>
+          </a:graphicData>
+        </a:graphic>
+      </p:graphicFrame>
+      <p:graphicFrame>
+        <p:nvGraphicFramePr>
+          <p:cNvPr id="4" name="Table 3">
+            <a:extLst>
+              <a:ext uri="{FF2B5EF4-FFF2-40B4-BE49-F238E27FC236}">
+                <a16:creationId xmlns:a16="http://schemas.microsoft.com/office/drawing/2014/main" id="{544E8CEF-3922-836A-C342-94792F27D8DF}"/>
+              </a:ext>
+            </a:extLst>
+          </p:cNvPr>
+          <p:cNvGraphicFramePr>
+            <a:graphicFrameLocks noGrp="1"/>
+          </p:cNvGraphicFramePr>
+          <p:nvPr>
+            <p:extLst>
+              <p:ext uri="{D42A27DB-BD31-4B8C-83A1-F6EECF244321}">
+                <p14:modId xmlns:p14="http://schemas.microsoft.com/office/powerpoint/2010/main" val="2700943407"/>
+              </p:ext>
+            </p:extLst>
+          </p:nvPr>
+        </p:nvGraphicFramePr>
+        <p:xfrm>
+          <a:off x="5131039" y="4935346"/>
+          <a:ext cx="1929922" cy="833115"/>
+        </p:xfrm>
+        <a:graphic>
+          <a:graphicData uri="http://schemas.openxmlformats.org/drawingml/2006/table">
+            <a:tbl>
+              <a:tblPr firstRow="1" bandRow="1">
+                <a:tableStyleId>{5940675A-B579-460E-94D1-54222C63F5DA}</a:tableStyleId>
+              </a:tblPr>
+              <a:tblGrid>
+                <a:gridCol w="1929922">
+                  <a:extLst>
+                    <a:ext uri="{9D8B030D-6E8A-4147-A177-3AD203B41FA5}">
+                      <a16:colId xmlns:a16="http://schemas.microsoft.com/office/drawing/2014/main" val="3058387547"/>
+                    </a:ext>
+                  </a:extLst>
+                </a:gridCol>
+              </a:tblGrid>
+              <a:tr h="373155">
+                <a:tc>
+                  <a:txBody>
+                    <a:bodyPr/>
+                    <a:lstStyle/>
+                    <a:p>
+                      <a:pPr marL="0" marR="0" lvl="0" indent="0" algn="ctr" defTabSz="914400" rtl="0" eaLnBrk="1" fontAlgn="auto" latinLnBrk="0" hangingPunct="1">
+                        <a:lnSpc>
+                          <a:spcPct val="100000"/>
+                        </a:lnSpc>
+                        <a:spcBef>
+                          <a:spcPts val="0"/>
+                        </a:spcBef>
+                        <a:spcAft>
+                          <a:spcPts val="0"/>
+                        </a:spcAft>
+                        <a:buClrTx/>
+                        <a:buSzTx/>
+                        <a:buFontTx/>
+                        <a:buNone/>
+                        <a:tabLst/>
+                        <a:defRPr/>
+                      </a:pPr>
+                      <a:r>
+                        <a:rPr lang="en-PH" sz="1500" b="1" dirty="0"/>
+                        <a:t>sum</a:t>
+                      </a:r>
+                    </a:p>
+                  </a:txBody>
+                  <a:tcPr anchor="ctr">
+                    <a:solidFill>
+                      <a:schemeClr val="accent4">
+                        <a:lumMod val="40000"/>
+                        <a:lumOff val="60000"/>
+                      </a:schemeClr>
+                    </a:solidFill>
+                  </a:tcPr>
+                </a:tc>
+                <a:extLst>
+                  <a:ext uri="{0D108BD9-81ED-4DB2-BD59-A6C34878D82A}">
+                    <a16:rowId xmlns:a16="http://schemas.microsoft.com/office/drawing/2014/main" val="2556140539"/>
+                  </a:ext>
+                </a:extLst>
+              </a:tr>
+              <a:tr h="459960">
+                <a:tc>
+                  <a:txBody>
+                    <a:bodyPr/>
+                    <a:lstStyle/>
+                    <a:p>
+                      <a:pPr algn="ctr"/>
+                      <a:r>
+                        <a:rPr lang="en-PH" dirty="0"/>
+                        <a:t>17.25</a:t>
+                      </a:r>
+                    </a:p>
+                  </a:txBody>
+                  <a:tcPr anchor="ctr"/>
+                </a:tc>
+                <a:extLst>
+                  <a:ext uri="{0D108BD9-81ED-4DB2-BD59-A6C34878D82A}">
+                    <a16:rowId xmlns:a16="http://schemas.microsoft.com/office/drawing/2014/main" val="3326491140"/>
+                  </a:ext>
+                </a:extLst>
+              </a:tr>
+            </a:tbl>
+          </a:graphicData>
+        </a:graphic>
+      </p:graphicFrame>
+      <p:sp>
+        <p:nvSpPr>
+          <p:cNvPr id="5" name="Content Placeholder 2">
+            <a:extLst>
+              <a:ext uri="{FF2B5EF4-FFF2-40B4-BE49-F238E27FC236}">
+                <a16:creationId xmlns:a16="http://schemas.microsoft.com/office/drawing/2014/main" id="{8D3C2730-6420-39A3-A99D-D11E0B2399F6}"/>
+              </a:ext>
+            </a:extLst>
+          </p:cNvPr>
+          <p:cNvSpPr txBox="1">
+            <a:spLocks/>
+          </p:cNvSpPr>
+          <p:nvPr/>
+        </p:nvSpPr>
+        <p:spPr>
+          <a:xfrm>
+            <a:off x="5432920" y="4173275"/>
+            <a:ext cx="1326160" cy="489055"/>
+          </a:xfrm>
+          <a:prstGeom prst="rect">
+            <a:avLst/>
+          </a:prstGeom>
+        </p:spPr>
+        <p:txBody>
+          <a:bodyPr>
+            <a:normAutofit fontScale="92500"/>
+          </a:bodyPr>
+          <a:lstStyle>
+            <a:lvl1pPr marL="228600" indent="-228600" algn="l" defTabSz="914400" rtl="0" eaLnBrk="1" latinLnBrk="0" hangingPunct="1">
+              <a:lnSpc>
+                <a:spcPct val="90000"/>
+              </a:lnSpc>
+              <a:spcBef>
+                <a:spcPts val="1000"/>
+              </a:spcBef>
+              <a:buFont typeface="Arial" panose="020B0604020202020204" pitchFamily="34" charset="0"/>
+              <a:buChar char="•"/>
+              <a:defRPr sz="2800" kern="1200">
+                <a:solidFill>
+                  <a:schemeClr val="tx1"/>
+                </a:solidFill>
+                <a:latin typeface="+mn-lt"/>
+                <a:ea typeface="+mn-ea"/>
+                <a:cs typeface="+mn-cs"/>
+              </a:defRPr>
+            </a:lvl1pPr>
+            <a:lvl2pPr marL="685800" indent="-228600" algn="l" defTabSz="914400" rtl="0" eaLnBrk="1" latinLnBrk="0" hangingPunct="1">
+              <a:lnSpc>
+                <a:spcPct val="90000"/>
+              </a:lnSpc>
+              <a:spcBef>
+                <a:spcPts val="500"/>
+              </a:spcBef>
+              <a:buFont typeface="Arial" panose="020B0604020202020204" pitchFamily="34" charset="0"/>
+              <a:buChar char="•"/>
+              <a:defRPr sz="2400" kern="1200">
+                <a:solidFill>
+                  <a:schemeClr val="tx1"/>
+                </a:solidFill>
+                <a:latin typeface="+mn-lt"/>
+                <a:ea typeface="+mn-ea"/>
+                <a:cs typeface="+mn-cs"/>
+              </a:defRPr>
+            </a:lvl2pPr>
+            <a:lvl3pPr marL="1143000" indent="-228600" algn="l" defTabSz="914400" rtl="0" eaLnBrk="1" latinLnBrk="0" hangingPunct="1">
+              <a:lnSpc>
+                <a:spcPct val="90000"/>
+              </a:lnSpc>
+              <a:spcBef>
+                <a:spcPts val="500"/>
+              </a:spcBef>
+              <a:buFont typeface="Arial" panose="020B0604020202020204" pitchFamily="34" charset="0"/>
+              <a:buChar char="•"/>
+              <a:defRPr sz="2000" kern="1200">
+                <a:solidFill>
+                  <a:schemeClr val="tx1"/>
+                </a:solidFill>
+                <a:latin typeface="+mn-lt"/>
+                <a:ea typeface="+mn-ea"/>
+                <a:cs typeface="+mn-cs"/>
+              </a:defRPr>
+            </a:lvl3pPr>
+            <a:lvl4pPr marL="1600200" indent="-228600" algn="l" defTabSz="914400" rtl="0" eaLnBrk="1" latinLnBrk="0" hangingPunct="1">
+              <a:lnSpc>
+                <a:spcPct val="90000"/>
+              </a:lnSpc>
+              <a:spcBef>
+                <a:spcPts val="500"/>
+              </a:spcBef>
+              <a:buFont typeface="Arial" panose="020B0604020202020204" pitchFamily="34" charset="0"/>
+              <a:buChar char="•"/>
+              <a:defRPr sz="1800" kern="1200">
+                <a:solidFill>
+                  <a:schemeClr val="tx1"/>
+                </a:solidFill>
+                <a:latin typeface="+mn-lt"/>
+                <a:ea typeface="+mn-ea"/>
+                <a:cs typeface="+mn-cs"/>
+              </a:defRPr>
+            </a:lvl4pPr>
+            <a:lvl5pPr marL="2057400" indent="-228600" algn="l" defTabSz="914400" rtl="0" eaLnBrk="1" latinLnBrk="0" hangingPunct="1">
+              <a:lnSpc>
+                <a:spcPct val="90000"/>
+              </a:lnSpc>
+              <a:spcBef>
+                <a:spcPts val="500"/>
+              </a:spcBef>
+              <a:buFont typeface="Arial" panose="020B0604020202020204" pitchFamily="34" charset="0"/>
+              <a:buChar char="•"/>
+              <a:defRPr sz="1800" kern="1200">
+                <a:solidFill>
+                  <a:schemeClr val="tx1"/>
+                </a:solidFill>
+                <a:latin typeface="+mn-lt"/>
+                <a:ea typeface="+mn-ea"/>
+                <a:cs typeface="+mn-cs"/>
+              </a:defRPr>
+            </a:lvl5pPr>
+            <a:lvl6pPr marL="2514600" indent="-228600" algn="l" defTabSz="914400" rtl="0" eaLnBrk="1" latinLnBrk="0" hangingPunct="1">
+              <a:lnSpc>
+                <a:spcPct val="90000"/>
+              </a:lnSpc>
+              <a:spcBef>
+                <a:spcPts val="500"/>
+              </a:spcBef>
+              <a:buFont typeface="Arial" panose="020B0604020202020204" pitchFamily="34" charset="0"/>
+              <a:buChar char="•"/>
+              <a:defRPr sz="1800" kern="1200">
+                <a:solidFill>
+                  <a:schemeClr val="tx1"/>
+                </a:solidFill>
+                <a:latin typeface="+mn-lt"/>
+                <a:ea typeface="+mn-ea"/>
+                <a:cs typeface="+mn-cs"/>
+              </a:defRPr>
+            </a:lvl6pPr>
+            <a:lvl7pPr marL="2971800" indent="-228600" algn="l" defTabSz="914400" rtl="0" eaLnBrk="1" latinLnBrk="0" hangingPunct="1">
+              <a:lnSpc>
+                <a:spcPct val="90000"/>
+              </a:lnSpc>
+              <a:spcBef>
+                <a:spcPts val="500"/>
+              </a:spcBef>
+              <a:buFont typeface="Arial" panose="020B0604020202020204" pitchFamily="34" charset="0"/>
+              <a:buChar char="•"/>
+              <a:defRPr sz="1800" kern="1200">
+                <a:solidFill>
+                  <a:schemeClr val="tx1"/>
+                </a:solidFill>
+                <a:latin typeface="+mn-lt"/>
+                <a:ea typeface="+mn-ea"/>
+                <a:cs typeface="+mn-cs"/>
+              </a:defRPr>
+            </a:lvl7pPr>
+            <a:lvl8pPr marL="3429000" indent="-228600" algn="l" defTabSz="914400" rtl="0" eaLnBrk="1" latinLnBrk="0" hangingPunct="1">
+              <a:lnSpc>
+                <a:spcPct val="90000"/>
+              </a:lnSpc>
+              <a:spcBef>
+                <a:spcPts val="500"/>
+              </a:spcBef>
+              <a:buFont typeface="Arial" panose="020B0604020202020204" pitchFamily="34" charset="0"/>
+              <a:buChar char="•"/>
+              <a:defRPr sz="1800" kern="1200">
+                <a:solidFill>
+                  <a:schemeClr val="tx1"/>
+                </a:solidFill>
+                <a:latin typeface="+mn-lt"/>
+                <a:ea typeface="+mn-ea"/>
+                <a:cs typeface="+mn-cs"/>
+              </a:defRPr>
+            </a:lvl8pPr>
+            <a:lvl9pPr marL="3886200" indent="-228600" algn="l" defTabSz="914400" rtl="0" eaLnBrk="1" latinLnBrk="0" hangingPunct="1">
+              <a:lnSpc>
+                <a:spcPct val="90000"/>
+              </a:lnSpc>
+              <a:spcBef>
+                <a:spcPts val="500"/>
+              </a:spcBef>
+              <a:buFont typeface="Arial" panose="020B0604020202020204" pitchFamily="34" charset="0"/>
+              <a:buChar char="•"/>
+              <a:defRPr sz="1800" kern="1200">
+                <a:solidFill>
+                  <a:schemeClr val="tx1"/>
+                </a:solidFill>
+                <a:latin typeface="+mn-lt"/>
+                <a:ea typeface="+mn-ea"/>
+                <a:cs typeface="+mn-cs"/>
+              </a:defRPr>
+            </a:lvl9pPr>
+          </a:lstStyle>
+          <a:p>
+            <a:pPr marL="0" indent="0">
+              <a:buFont typeface="Arial" panose="020B0604020202020204" pitchFamily="34" charset="0"/>
+              <a:buNone/>
+            </a:pPr>
+            <a:r>
+              <a:rPr lang="en-PH" sz="3000" dirty="0"/>
+              <a:t>Result:</a:t>
+            </a:r>
+          </a:p>
+        </p:txBody>
+      </p:sp>
+      <p:pic>
+        <p:nvPicPr>
+          <p:cNvPr id="6" name="Picture 5" descr="A black rectangular with yellow green and blue text&#10;&#10;AI-generated content may be incorrect.">
+            <a:extLst>
+              <a:ext uri="{FF2B5EF4-FFF2-40B4-BE49-F238E27FC236}">
+                <a16:creationId xmlns:a16="http://schemas.microsoft.com/office/drawing/2014/main" id="{8F93E651-CD3D-9D0C-767A-35E3117070A6}"/>
+              </a:ext>
+            </a:extLst>
+          </p:cNvPr>
+          <p:cNvPicPr>
+            <a:picLocks noChangeAspect="1"/>
+          </p:cNvPicPr>
+          <p:nvPr/>
+        </p:nvPicPr>
+        <p:blipFill>
+          <a:blip r:embed="rId2"/>
+          <a:stretch>
+            <a:fillRect/>
+          </a:stretch>
+        </p:blipFill>
+        <p:spPr>
+          <a:xfrm>
+            <a:off x="6377163" y="366671"/>
+            <a:ext cx="5321739" cy="2880000"/>
+          </a:xfrm>
+          <a:prstGeom prst="rect">
+            <a:avLst/>
+          </a:prstGeom>
+        </p:spPr>
+      </p:pic>
+    </p:spTree>
+    <p:extLst>
+      <p:ext uri="{BB962C8B-B14F-4D97-AF65-F5344CB8AC3E}">
+        <p14:creationId xmlns:p14="http://schemas.microsoft.com/office/powerpoint/2010/main" val="253191522"/>
+      </p:ext>
+    </p:extLst>
+  </p:cSld>
+  <p:clrMapOvr>
+    <a:masterClrMapping/>
+  </p:clrMapOvr>
+  <p:timing>
+    <p:tnLst>
+      <p:par>
+        <p:cTn id="1" dur="indefinite" restart="never" nodeType="tmRoot">
+          <p:childTnLst>
+            <p:seq concurrent="1" nextAc="seek">
+              <p:cTn id="2" dur="indefinite" nodeType="mainSeq">
+                <p:childTnLst>
+                  <p:par>
+                    <p:cTn id="3" fill="hold">
+                      <p:stCondLst>
+                        <p:cond delay="indefinite"/>
+                      </p:stCondLst>
+                      <p:childTnLst>
+                        <p:par>
+                          <p:cTn id="4" fill="hold">
+                            <p:stCondLst>
+                              <p:cond delay="0"/>
+                            </p:stCondLst>
+                            <p:childTnLst>
+                              <p:par>
+                                <p:cTn id="5" presetID="10" presetClass="entr" presetSubtype="0" fill="hold" grpId="0" nodeType="clickEffect">
+                                  <p:stCondLst>
+                                    <p:cond delay="0"/>
+                                  </p:stCondLst>
+                                  <p:childTnLst>
+                                    <p:set>
+                                      <p:cBhvr>
+                                        <p:cTn id="6" dur="1" fill="hold">
+                                          <p:stCondLst>
+                                            <p:cond delay="0"/>
+                                          </p:stCondLst>
+                                        </p:cTn>
+                                        <p:tgtEl>
+                                          <p:spTgt spid="5"/>
+                                        </p:tgtEl>
+                                        <p:attrNameLst>
+                                          <p:attrName>style.visibility</p:attrName>
+                                        </p:attrNameLst>
+                                      </p:cBhvr>
+                                      <p:to>
+                                        <p:strVal val="visible"/>
+                                      </p:to>
+                                    </p:set>
+                                    <p:animEffect transition="in" filter="fade">
+                                      <p:cBhvr>
+                                        <p:cTn id="7" dur="500"/>
+                                        <p:tgtEl>
+                                          <p:spTgt spid="5"/>
+                                        </p:tgtEl>
+                                      </p:cBhvr>
+                                    </p:animEffect>
+                                  </p:childTnLst>
+                                </p:cTn>
+                              </p:par>
+                            </p:childTnLst>
+                          </p:cTn>
+                        </p:par>
+                      </p:childTnLst>
+                    </p:cTn>
+                  </p:par>
+                </p:childTnLst>
+              </p:cTn>
+              <p:prevCondLst>
+                <p:cond evt="onPrev" delay="0">
+                  <p:tgtEl>
+                    <p:sldTgt/>
+                  </p:tgtEl>
+                </p:cond>
+              </p:prevCondLst>
+              <p:nextCondLst>
+                <p:cond evt="onNext" delay="0">
+                  <p:tgtEl>
+                    <p:sldTgt/>
+                  </p:tgtEl>
+                </p:cond>
+              </p:nextCondLst>
+            </p:seq>
+          </p:childTnLst>
+        </p:cTn>
+      </p:par>
+    </p:tnLst>
+    <p:bldLst>
+      <p:bldP spid="5" grpId="0"/>
+    </p:bldLst>
+  </p:timing>
+</p:sld>
+</file>
+
+<file path=ppt/slides/slide11.xml><?xml version="1.0" encoding="utf-8"?>
+<p:sld xmlns:a="http://schemas.openxmlformats.org/drawingml/2006/main" xmlns:r="http://schemas.openxmlformats.org/officeDocument/2006/relationships" xmlns:p="http://schemas.openxmlformats.org/presentationml/2006/main">
+  <p:cSld>
+    <p:spTree>
+      <p:nvGrpSpPr>
+        <p:cNvPr id="1" name="">
+          <a:extLst>
+            <a:ext uri="{FF2B5EF4-FFF2-40B4-BE49-F238E27FC236}">
+              <a16:creationId xmlns:a16="http://schemas.microsoft.com/office/drawing/2014/main" id="{1A9F3F5C-C8A9-CB6D-DA6D-118A41D32C9F}"/>
+            </a:ext>
+          </a:extLst>
+        </p:cNvPr>
+        <p:cNvGrpSpPr/>
+        <p:nvPr/>
+      </p:nvGrpSpPr>
+      <p:grpSpPr>
+        <a:xfrm>
+          <a:off x="0" y="0"/>
+          <a:ext cx="0" cy="0"/>
+          <a:chOff x="0" y="0"/>
+          <a:chExt cx="0" cy="0"/>
+        </a:xfrm>
+      </p:grpSpPr>
+      <p:sp>
+        <p:nvSpPr>
+          <p:cNvPr id="2" name="Title 1">
+            <a:extLst>
+              <a:ext uri="{FF2B5EF4-FFF2-40B4-BE49-F238E27FC236}">
+                <a16:creationId xmlns:a16="http://schemas.microsoft.com/office/drawing/2014/main" id="{150F5D4A-522F-C848-A605-065084856A6B}"/>
+              </a:ext>
+            </a:extLst>
+          </p:cNvPr>
+          <p:cNvSpPr>
+            <a:spLocks noGrp="1"/>
+          </p:cNvSpPr>
+          <p:nvPr>
+            <p:ph type="title"/>
+          </p:nvPr>
+        </p:nvSpPr>
+        <p:spPr/>
+        <p:txBody>
+          <a:bodyPr/>
+          <a:lstStyle/>
+          <a:p>
+            <a:r>
+              <a:rPr lang="en-US" dirty="0"/>
+              <a:t>SQL GROUP BY</a:t>
+            </a:r>
+          </a:p>
+        </p:txBody>
+      </p:sp>
+      <p:sp>
+        <p:nvSpPr>
+          <p:cNvPr id="6" name="Rectangle 2">
+            <a:extLst>
+              <a:ext uri="{FF2B5EF4-FFF2-40B4-BE49-F238E27FC236}">
+                <a16:creationId xmlns:a16="http://schemas.microsoft.com/office/drawing/2014/main" id="{5887DCE8-2EE6-F654-8039-F26852182283}"/>
+              </a:ext>
+            </a:extLst>
+          </p:cNvPr>
+          <p:cNvSpPr>
+            <a:spLocks noChangeArrowheads="1"/>
+          </p:cNvSpPr>
+          <p:nvPr/>
+        </p:nvSpPr>
+        <p:spPr bwMode="auto">
+          <a:xfrm>
+            <a:off x="838200" y="2151932"/>
+            <a:ext cx="10650940" cy="2862322"/>
+          </a:xfrm>
+          <a:prstGeom prst="rect">
+            <a:avLst/>
+          </a:prstGeom>
+          <a:solidFill>
+            <a:srgbClr val="FFFFFF"/>
+          </a:solidFill>
+          <a:ln>
+            <a:noFill/>
+          </a:ln>
+          <a:effectLst/>
+          <a:extLst>
+            <a:ext uri="{91240B29-F687-4F45-9708-019B960494DF}">
+              <a14:hiddenLine xmlns:a14="http://schemas.microsoft.com/office/drawing/2010/main" w="9525">
+                <a:solidFill>
+                  <a:schemeClr val="tx1"/>
+                </a:solidFill>
+                <a:miter lim="800000"/>
+                <a:headEnd/>
+                <a:tailEnd/>
+              </a14:hiddenLine>
+            </a:ext>
+            <a:ext uri="{AF507438-7753-43E0-B8FC-AC1667EBCBE1}">
+              <a14:hiddenEffects xmlns:a14="http://schemas.microsoft.com/office/drawing/2010/main">
+                <a:effectLst>
+                  <a:outerShdw dist="35921" dir="2700000" algn="ctr" rotWithShape="0">
+                    <a:schemeClr val="bg2"/>
+                  </a:outerShdw>
+                </a:effectLst>
+              </a14:hiddenEffects>
+            </a:ext>
+          </a:extLst>
+        </p:spPr>
+        <p:txBody>
+          <a:bodyPr vert="horz" wrap="square" lIns="91440" tIns="45720" rIns="91440" bIns="45720" numCol="1" anchor="ctr" anchorCtr="0" compatLnSpc="1">
+            <a:prstTxWarp prst="textNoShape">
+              <a:avLst/>
+            </a:prstTxWarp>
+            <a:spAutoFit/>
+          </a:bodyPr>
+          <a:lstStyle>
+            <a:lvl1pPr eaLnBrk="0" fontAlgn="base" hangingPunct="0">
+              <a:spcBef>
+                <a:spcPct val="0"/>
+              </a:spcBef>
+              <a:spcAft>
+                <a:spcPct val="0"/>
+              </a:spcAft>
+              <a:defRPr>
+                <a:solidFill>
+                  <a:schemeClr val="tx1"/>
+                </a:solidFill>
+                <a:latin typeface="Arial" panose="020B0604020202020204" pitchFamily="34" charset="0"/>
+              </a:defRPr>
+            </a:lvl1pPr>
+            <a:lvl2pPr eaLnBrk="0" fontAlgn="base" hangingPunct="0">
+              <a:spcBef>
+                <a:spcPct val="0"/>
+              </a:spcBef>
+              <a:spcAft>
+                <a:spcPct val="0"/>
+              </a:spcAft>
+              <a:defRPr>
+                <a:solidFill>
+                  <a:schemeClr val="tx1"/>
+                </a:solidFill>
+                <a:latin typeface="Arial" panose="020B0604020202020204" pitchFamily="34" charset="0"/>
+              </a:defRPr>
+            </a:lvl2pPr>
+            <a:lvl3pPr eaLnBrk="0" fontAlgn="base" hangingPunct="0">
+              <a:spcBef>
+                <a:spcPct val="0"/>
+              </a:spcBef>
+              <a:spcAft>
+                <a:spcPct val="0"/>
+              </a:spcAft>
+              <a:defRPr>
+                <a:solidFill>
+                  <a:schemeClr val="tx1"/>
+                </a:solidFill>
+                <a:latin typeface="Arial" panose="020B0604020202020204" pitchFamily="34" charset="0"/>
+              </a:defRPr>
+            </a:lvl3pPr>
+            <a:lvl4pPr eaLnBrk="0" fontAlgn="base" hangingPunct="0">
+              <a:spcBef>
+                <a:spcPct val="0"/>
+              </a:spcBef>
+              <a:spcAft>
+                <a:spcPct val="0"/>
+              </a:spcAft>
+              <a:defRPr>
+                <a:solidFill>
+                  <a:schemeClr val="tx1"/>
+                </a:solidFill>
+                <a:latin typeface="Arial" panose="020B0604020202020204" pitchFamily="34" charset="0"/>
+              </a:defRPr>
+            </a:lvl4pPr>
+            <a:lvl5pPr eaLnBrk="0" fontAlgn="base" hangingPunct="0">
+              <a:spcBef>
+                <a:spcPct val="0"/>
+              </a:spcBef>
+              <a:spcAft>
+                <a:spcPct val="0"/>
+              </a:spcAft>
+              <a:defRPr>
+                <a:solidFill>
+                  <a:schemeClr val="tx1"/>
+                </a:solidFill>
+                <a:latin typeface="Arial" panose="020B0604020202020204" pitchFamily="34" charset="0"/>
+              </a:defRPr>
+            </a:lvl5pPr>
+            <a:lvl6pPr eaLnBrk="0" fontAlgn="base" hangingPunct="0">
+              <a:spcBef>
+                <a:spcPct val="0"/>
+              </a:spcBef>
+              <a:spcAft>
+                <a:spcPct val="0"/>
+              </a:spcAft>
+              <a:defRPr>
+                <a:solidFill>
+                  <a:schemeClr val="tx1"/>
+                </a:solidFill>
+                <a:latin typeface="Arial" panose="020B0604020202020204" pitchFamily="34" charset="0"/>
+              </a:defRPr>
+            </a:lvl6pPr>
+            <a:lvl7pPr eaLnBrk="0" fontAlgn="base" hangingPunct="0">
+              <a:spcBef>
+                <a:spcPct val="0"/>
+              </a:spcBef>
+              <a:spcAft>
+                <a:spcPct val="0"/>
+              </a:spcAft>
+              <a:defRPr>
+                <a:solidFill>
+                  <a:schemeClr val="tx1"/>
+                </a:solidFill>
+                <a:latin typeface="Arial" panose="020B0604020202020204" pitchFamily="34" charset="0"/>
+              </a:defRPr>
+            </a:lvl7pPr>
+            <a:lvl8pPr eaLnBrk="0" fontAlgn="base" hangingPunct="0">
+              <a:spcBef>
+                <a:spcPct val="0"/>
+              </a:spcBef>
+              <a:spcAft>
+                <a:spcPct val="0"/>
+              </a:spcAft>
+              <a:defRPr>
+                <a:solidFill>
+                  <a:schemeClr val="tx1"/>
+                </a:solidFill>
+                <a:latin typeface="Arial" panose="020B0604020202020204" pitchFamily="34" charset="0"/>
+              </a:defRPr>
+            </a:lvl8pPr>
+            <a:lvl9pPr eaLnBrk="0" fontAlgn="base" hangingPunct="0">
+              <a:spcBef>
+                <a:spcPct val="0"/>
+              </a:spcBef>
+              <a:spcAft>
+                <a:spcPct val="0"/>
+              </a:spcAft>
+              <a:defRPr>
+                <a:solidFill>
+                  <a:schemeClr val="tx1"/>
+                </a:solidFill>
+                <a:latin typeface="Arial" panose="020B0604020202020204" pitchFamily="34" charset="0"/>
+              </a:defRPr>
+            </a:lvl9pPr>
+          </a:lstStyle>
+          <a:p>
+            <a:pPr marL="0" marR="0" lvl="0" indent="0" algn="l" defTabSz="914400" rtl="0" eaLnBrk="0" fontAlgn="base" latinLnBrk="0" hangingPunct="0">
+              <a:lnSpc>
+                <a:spcPct val="100000"/>
+              </a:lnSpc>
+              <a:spcBef>
+                <a:spcPct val="0"/>
+              </a:spcBef>
+              <a:spcAft>
+                <a:spcPct val="0"/>
+              </a:spcAft>
+              <a:buClrTx/>
+              <a:buSzTx/>
+              <a:buFontTx/>
+              <a:buNone/>
+              <a:tabLst/>
+            </a:pPr>
+            <a:r>
+              <a:rPr lang="en-US" altLang="en-US" sz="3000" dirty="0">
+                <a:latin typeface="Aptos (Body)"/>
+              </a:rPr>
+              <a:t>The GROUP BY statement groups rows that have the same values into summary rows.</a:t>
+            </a:r>
+          </a:p>
+          <a:p>
+            <a:pPr marL="0" marR="0" lvl="0" indent="0" algn="l" defTabSz="914400" rtl="0" eaLnBrk="0" fontAlgn="base" latinLnBrk="0" hangingPunct="0">
+              <a:lnSpc>
+                <a:spcPct val="100000"/>
+              </a:lnSpc>
+              <a:spcBef>
+                <a:spcPct val="0"/>
+              </a:spcBef>
+              <a:spcAft>
+                <a:spcPct val="0"/>
+              </a:spcAft>
+              <a:buClrTx/>
+              <a:buSzTx/>
+              <a:buFontTx/>
+              <a:buNone/>
+              <a:tabLst/>
+            </a:pPr>
+            <a:endParaRPr lang="en-US" altLang="en-US" sz="3000" dirty="0">
+              <a:latin typeface="Aptos (Body)"/>
+            </a:endParaRPr>
+          </a:p>
+          <a:p>
+            <a:pPr marL="0" marR="0" lvl="0" indent="0" algn="l" defTabSz="914400" rtl="0" eaLnBrk="0" fontAlgn="base" latinLnBrk="0" hangingPunct="0">
+              <a:lnSpc>
+                <a:spcPct val="100000"/>
+              </a:lnSpc>
+              <a:spcBef>
+                <a:spcPct val="0"/>
+              </a:spcBef>
+              <a:spcAft>
+                <a:spcPct val="0"/>
+              </a:spcAft>
+              <a:buClrTx/>
+              <a:buSzTx/>
+              <a:buFontTx/>
+              <a:buNone/>
+              <a:tabLst/>
+            </a:pPr>
+            <a:r>
+              <a:rPr lang="en-US" altLang="en-US" sz="3000" dirty="0">
+                <a:latin typeface="Aptos (Body)"/>
+              </a:rPr>
+              <a:t>The GROUP BY statement is often used with aggregate functions (COUNT(), MAX(), MIN(), SUM(), AVG()) to group the result-set by one or more columns.</a:t>
+            </a:r>
+          </a:p>
+        </p:txBody>
+      </p:sp>
+    </p:spTree>
+    <p:extLst>
+      <p:ext uri="{BB962C8B-B14F-4D97-AF65-F5344CB8AC3E}">
+        <p14:creationId xmlns:p14="http://schemas.microsoft.com/office/powerpoint/2010/main" val="2551915959"/>
+      </p:ext>
+    </p:extLst>
+  </p:cSld>
+  <p:clrMapOvr>
+    <a:masterClrMapping/>
+  </p:clrMapOvr>
+</p:sld>
+</file>
+
+<file path=ppt/slides/slide12.xml><?xml version="1.0" encoding="utf-8"?>
+<p:sld xmlns:a="http://schemas.openxmlformats.org/drawingml/2006/main" xmlns:r="http://schemas.openxmlformats.org/officeDocument/2006/relationships" xmlns:p="http://schemas.openxmlformats.org/presentationml/2006/main" showMasterSp="0">
+  <p:cSld>
+    <p:spTree>
+      <p:nvGrpSpPr>
+        <p:cNvPr id="1" name="">
+          <a:extLst>
+            <a:ext uri="{FF2B5EF4-FFF2-40B4-BE49-F238E27FC236}">
               <a16:creationId xmlns:a16="http://schemas.microsoft.com/office/drawing/2014/main" id="{19F1C8AF-6F4B-4726-80A5-417816ED9E67}"/>
             </a:ext>
           </a:extLst>
@@ -11210,7 +12683,7 @@
 </p:sld>
 </file>
 
-<file path=ppt/slides/slide11.xml><?xml version="1.0" encoding="utf-8"?>
+<file path=ppt/slides/slide13.xml><?xml version="1.0" encoding="utf-8"?>
 <p:sld xmlns:a="http://schemas.openxmlformats.org/drawingml/2006/main" xmlns:r="http://schemas.openxmlformats.org/officeDocument/2006/relationships" xmlns:p="http://schemas.openxmlformats.org/presentationml/2006/main" showMasterSp="0">
   <p:cSld>
     <p:spTree>
@@ -12685,7 +14158,7 @@
 </p:sld>
 </file>
 
-<file path=ppt/slides/slide12.xml><?xml version="1.0" encoding="utf-8"?>
+<file path=ppt/slides/slide14.xml><?xml version="1.0" encoding="utf-8"?>
 <p:sld xmlns:a="http://schemas.openxmlformats.org/drawingml/2006/main" xmlns:r="http://schemas.openxmlformats.org/officeDocument/2006/relationships" xmlns:p="http://schemas.openxmlformats.org/presentationml/2006/main" showMasterSp="0">
   <p:cSld>
     <p:spTree>
@@ -14802,7 +16275,7 @@
 </p:sld>
 </file>
 
-<file path=ppt/slides/slide13.xml><?xml version="1.0" encoding="utf-8"?>
+<file path=ppt/slides/slide15.xml><?xml version="1.0" encoding="utf-8"?>
 <p:sld xmlns:a="http://schemas.openxmlformats.org/drawingml/2006/main" xmlns:r="http://schemas.openxmlformats.org/officeDocument/2006/relationships" xmlns:p="http://schemas.openxmlformats.org/presentationml/2006/main" showMasterSp="0">
   <p:cSld>
     <p:spTree>
@@ -16919,7 +18392,7 @@
 </p:sld>
 </file>
 
-<file path=ppt/slides/slide14.xml><?xml version="1.0" encoding="utf-8"?>
+<file path=ppt/slides/slide16.xml><?xml version="1.0" encoding="utf-8"?>
 <p:sld xmlns:a="http://schemas.openxmlformats.org/drawingml/2006/main" xmlns:r="http://schemas.openxmlformats.org/officeDocument/2006/relationships" xmlns:p="http://schemas.openxmlformats.org/presentationml/2006/main" showMasterSp="0">
   <p:cSld>
     <p:spTree>
@@ -18388,7 +19861,7 @@
 </p:sld>
 </file>
 
-<file path=ppt/slides/slide15.xml><?xml version="1.0" encoding="utf-8"?>
+<file path=ppt/slides/slide17.xml><?xml version="1.0" encoding="utf-8"?>
 <p:sld xmlns:a="http://schemas.openxmlformats.org/drawingml/2006/main" xmlns:r="http://schemas.openxmlformats.org/officeDocument/2006/relationships" xmlns:p="http://schemas.openxmlformats.org/presentationml/2006/main" showMasterSp="0">
   <p:cSld>
     <p:spTree>
@@ -19857,7 +21330,7 @@
 </p:sld>
 </file>
 
-<file path=ppt/slides/slide16.xml><?xml version="1.0" encoding="utf-8"?>
+<file path=ppt/slides/slide18.xml><?xml version="1.0" encoding="utf-8"?>
 <p:sld xmlns:a="http://schemas.openxmlformats.org/drawingml/2006/main" xmlns:r="http://schemas.openxmlformats.org/officeDocument/2006/relationships" xmlns:p="http://schemas.openxmlformats.org/presentationml/2006/main" showMasterSp="0">
   <p:cSld>
     <p:spTree>
@@ -21643,23 +23116,6 @@
             </a:pPr>
             <a:r>
               <a:rPr lang="en-US" sz="3500" b="1" dirty="0"/>
-              <a:t>Introduction</a:t>
-            </a:r>
-          </a:p>
-          <a:p>
-            <a:pPr marL="685800" indent="-685800" algn="l">
-              <a:buFont typeface="Wingdings" pitchFamily="2" charset="2"/>
-              <a:buChar char="Ø"/>
-            </a:pPr>
-            <a:r>
-              <a:rPr lang="en-US" sz="3500" b="1" dirty="0">
-                <a:solidFill>
-                  <a:schemeClr val="tx1">
-                    <a:lumMod val="50000"/>
-                    <a:lumOff val="50000"/>
-                  </a:schemeClr>
-                </a:solidFill>
-              </a:rPr>
               <a:t>SQL Functions</a:t>
             </a:r>
           </a:p>
@@ -21879,54 +23335,222 @@
           <a:p>
             <a:r>
               <a:rPr lang="en-US" dirty="0"/>
-              <a:t>SQL Join</a:t>
+              <a:t>SQL Aggregate Functions</a:t>
             </a:r>
           </a:p>
         </p:txBody>
       </p:sp>
       <p:sp>
         <p:nvSpPr>
-          <p:cNvPr id="3" name="Content Placeholder 2">
+          <p:cNvPr id="5" name="Rectangle 2">
             <a:extLst>
               <a:ext uri="{FF2B5EF4-FFF2-40B4-BE49-F238E27FC236}">
-                <a16:creationId xmlns:a16="http://schemas.microsoft.com/office/drawing/2014/main" id="{C74E074B-CA72-C01B-9004-814B981D1380}"/>
+                <a16:creationId xmlns:a16="http://schemas.microsoft.com/office/drawing/2014/main" id="{20DE1248-823F-DE9E-70B8-4D9A788D6B5F}"/>
               </a:ext>
             </a:extLst>
           </p:cNvPr>
           <p:cNvSpPr>
-            <a:spLocks noGrp="1"/>
+            <a:spLocks noGrp="1" noChangeArrowheads="1"/>
           </p:cNvSpPr>
           <p:nvPr>
             <p:ph idx="1"/>
           </p:nvPr>
         </p:nvSpPr>
-        <p:spPr/>
+        <p:spPr bwMode="auto">
+          <a:xfrm>
+            <a:off x="838200" y="2319974"/>
+            <a:ext cx="10196946" cy="1015663"/>
+          </a:xfrm>
+          <a:prstGeom prst="rect">
+            <a:avLst/>
+          </a:prstGeom>
+          <a:solidFill>
+            <a:srgbClr val="FFFFFF"/>
+          </a:solidFill>
+          <a:ln>
+            <a:noFill/>
+          </a:ln>
+          <a:effectLst/>
+          <a:extLst>
+            <a:ext uri="{91240B29-F687-4F45-9708-019B960494DF}">
+              <a14:hiddenLine xmlns:a14="http://schemas.microsoft.com/office/drawing/2010/main" w="9525">
+                <a:solidFill>
+                  <a:schemeClr val="tx1"/>
+                </a:solidFill>
+                <a:miter lim="800000"/>
+                <a:headEnd/>
+                <a:tailEnd/>
+              </a14:hiddenLine>
+            </a:ext>
+            <a:ext uri="{AF507438-7753-43E0-B8FC-AC1667EBCBE1}">
+              <a14:hiddenEffects xmlns:a14="http://schemas.microsoft.com/office/drawing/2010/main">
+                <a:effectLst>
+                  <a:outerShdw dist="35921" dir="2700000" algn="ctr" rotWithShape="0">
+                    <a:schemeClr val="bg2"/>
+                  </a:outerShdw>
+                </a:effectLst>
+              </a14:hiddenEffects>
+            </a:ext>
+          </a:extLst>
+        </p:spPr>
         <p:txBody>
-          <a:bodyPr>
-            <a:normAutofit/>
+          <a:bodyPr vert="horz" wrap="square" lIns="91440" tIns="45720" rIns="91440" bIns="45720" numCol="1" anchor="ctr" anchorCtr="0" compatLnSpc="1">
+            <a:prstTxWarp prst="textNoShape">
+              <a:avLst/>
+            </a:prstTxWarp>
+            <a:spAutoFit/>
           </a:bodyPr>
-          <a:lstStyle/>
+          <a:lstStyle>
+            <a:lvl1pPr eaLnBrk="0" fontAlgn="base" hangingPunct="0">
+              <a:spcBef>
+                <a:spcPct val="0"/>
+              </a:spcBef>
+              <a:spcAft>
+                <a:spcPct val="0"/>
+              </a:spcAft>
+              <a:defRPr>
+                <a:solidFill>
+                  <a:schemeClr val="tx1"/>
+                </a:solidFill>
+                <a:latin typeface="Arial" panose="020B0604020202020204" pitchFamily="34" charset="0"/>
+              </a:defRPr>
+            </a:lvl1pPr>
+            <a:lvl2pPr eaLnBrk="0" fontAlgn="base" hangingPunct="0">
+              <a:spcBef>
+                <a:spcPct val="0"/>
+              </a:spcBef>
+              <a:spcAft>
+                <a:spcPct val="0"/>
+              </a:spcAft>
+              <a:defRPr>
+                <a:solidFill>
+                  <a:schemeClr val="tx1"/>
+                </a:solidFill>
+                <a:latin typeface="Arial" panose="020B0604020202020204" pitchFamily="34" charset="0"/>
+              </a:defRPr>
+            </a:lvl2pPr>
+            <a:lvl3pPr eaLnBrk="0" fontAlgn="base" hangingPunct="0">
+              <a:spcBef>
+                <a:spcPct val="0"/>
+              </a:spcBef>
+              <a:spcAft>
+                <a:spcPct val="0"/>
+              </a:spcAft>
+              <a:defRPr>
+                <a:solidFill>
+                  <a:schemeClr val="tx1"/>
+                </a:solidFill>
+                <a:latin typeface="Arial" panose="020B0604020202020204" pitchFamily="34" charset="0"/>
+              </a:defRPr>
+            </a:lvl3pPr>
+            <a:lvl4pPr eaLnBrk="0" fontAlgn="base" hangingPunct="0">
+              <a:spcBef>
+                <a:spcPct val="0"/>
+              </a:spcBef>
+              <a:spcAft>
+                <a:spcPct val="0"/>
+              </a:spcAft>
+              <a:defRPr>
+                <a:solidFill>
+                  <a:schemeClr val="tx1"/>
+                </a:solidFill>
+                <a:latin typeface="Arial" panose="020B0604020202020204" pitchFamily="34" charset="0"/>
+              </a:defRPr>
+            </a:lvl4pPr>
+            <a:lvl5pPr eaLnBrk="0" fontAlgn="base" hangingPunct="0">
+              <a:spcBef>
+                <a:spcPct val="0"/>
+              </a:spcBef>
+              <a:spcAft>
+                <a:spcPct val="0"/>
+              </a:spcAft>
+              <a:defRPr>
+                <a:solidFill>
+                  <a:schemeClr val="tx1"/>
+                </a:solidFill>
+                <a:latin typeface="Arial" panose="020B0604020202020204" pitchFamily="34" charset="0"/>
+              </a:defRPr>
+            </a:lvl5pPr>
+            <a:lvl6pPr eaLnBrk="0" fontAlgn="base" hangingPunct="0">
+              <a:spcBef>
+                <a:spcPct val="0"/>
+              </a:spcBef>
+              <a:spcAft>
+                <a:spcPct val="0"/>
+              </a:spcAft>
+              <a:defRPr>
+                <a:solidFill>
+                  <a:schemeClr val="tx1"/>
+                </a:solidFill>
+                <a:latin typeface="Arial" panose="020B0604020202020204" pitchFamily="34" charset="0"/>
+              </a:defRPr>
+            </a:lvl6pPr>
+            <a:lvl7pPr eaLnBrk="0" fontAlgn="base" hangingPunct="0">
+              <a:spcBef>
+                <a:spcPct val="0"/>
+              </a:spcBef>
+              <a:spcAft>
+                <a:spcPct val="0"/>
+              </a:spcAft>
+              <a:defRPr>
+                <a:solidFill>
+                  <a:schemeClr val="tx1"/>
+                </a:solidFill>
+                <a:latin typeface="Arial" panose="020B0604020202020204" pitchFamily="34" charset="0"/>
+              </a:defRPr>
+            </a:lvl7pPr>
+            <a:lvl8pPr eaLnBrk="0" fontAlgn="base" hangingPunct="0">
+              <a:spcBef>
+                <a:spcPct val="0"/>
+              </a:spcBef>
+              <a:spcAft>
+                <a:spcPct val="0"/>
+              </a:spcAft>
+              <a:defRPr>
+                <a:solidFill>
+                  <a:schemeClr val="tx1"/>
+                </a:solidFill>
+                <a:latin typeface="Arial" panose="020B0604020202020204" pitchFamily="34" charset="0"/>
+              </a:defRPr>
+            </a:lvl8pPr>
+            <a:lvl9pPr eaLnBrk="0" fontAlgn="base" hangingPunct="0">
+              <a:spcBef>
+                <a:spcPct val="0"/>
+              </a:spcBef>
+              <a:spcAft>
+                <a:spcPct val="0"/>
+              </a:spcAft>
+              <a:defRPr>
+                <a:solidFill>
+                  <a:schemeClr val="tx1"/>
+                </a:solidFill>
+                <a:latin typeface="Arial" panose="020B0604020202020204" pitchFamily="34" charset="0"/>
+              </a:defRPr>
+            </a:lvl9pPr>
+          </a:lstStyle>
           <a:p>
-            <a:pPr marL="0" indent="0">
+            <a:pPr marL="0" marR="0" lvl="0" indent="0" algn="l" defTabSz="914400" rtl="0" eaLnBrk="0" fontAlgn="base" latinLnBrk="0" hangingPunct="0">
+              <a:lnSpc>
+                <a:spcPct val="100000"/>
+              </a:lnSpc>
+              <a:spcBef>
+                <a:spcPct val="0"/>
+              </a:spcBef>
+              <a:spcAft>
+                <a:spcPct val="0"/>
+              </a:spcAft>
+              <a:buClrTx/>
+              <a:buSzTx/>
+              <a:buFontTx/>
               <a:buNone/>
+              <a:tabLst/>
             </a:pPr>
             <a:r>
-              <a:rPr lang="en-PH" sz="3500" dirty="0"/>
-              <a:t>A JOIN clause is used to </a:t>
+              <a:rPr lang="en-US" altLang="en-US" sz="3000" dirty="0">
+                <a:latin typeface="Aptos (Body)"/>
+              </a:rPr>
+              <a:t>An aggregate function is a function that performs a calculation on a set of values, and returns a single value.</a:t>
             </a:r>
-            <a:r>
-              <a:rPr lang="en-PH" sz="3500" b="1" dirty="0">
-                <a:solidFill>
-                  <a:srgbClr val="0070C0"/>
-                </a:solidFill>
-              </a:rPr>
-              <a:t>combine rows from two or more tables</a:t>
-            </a:r>
-            <a:r>
-              <a:rPr lang="en-PH" sz="3500" dirty="0"/>
-              <a:t>, based on a common key values between them.</a:t>
-            </a:r>
-            <a:endParaRPr lang="en-US" sz="3500" dirty="0"/>
           </a:p>
         </p:txBody>
       </p:sp>
@@ -21944,6 +23568,471 @@
 </file>
 
 <file path=ppt/slides/slide4.xml><?xml version="1.0" encoding="utf-8"?>
+<p:sld xmlns:a="http://schemas.openxmlformats.org/drawingml/2006/main" xmlns:r="http://schemas.openxmlformats.org/officeDocument/2006/relationships" xmlns:p="http://schemas.openxmlformats.org/presentationml/2006/main">
+  <p:cSld>
+    <p:spTree>
+      <p:nvGrpSpPr>
+        <p:cNvPr id="1" name="">
+          <a:extLst>
+            <a:ext uri="{FF2B5EF4-FFF2-40B4-BE49-F238E27FC236}">
+              <a16:creationId xmlns:a16="http://schemas.microsoft.com/office/drawing/2014/main" id="{4CB00C59-BFC5-3EB9-B45E-EAB32E39A450}"/>
+            </a:ext>
+          </a:extLst>
+        </p:cNvPr>
+        <p:cNvGrpSpPr/>
+        <p:nvPr/>
+      </p:nvGrpSpPr>
+      <p:grpSpPr>
+        <a:xfrm>
+          <a:off x="0" y="0"/>
+          <a:ext cx="0" cy="0"/>
+          <a:chOff x="0" y="0"/>
+          <a:chExt cx="0" cy="0"/>
+        </a:xfrm>
+      </p:grpSpPr>
+      <p:sp>
+        <p:nvSpPr>
+          <p:cNvPr id="2" name="Title 1">
+            <a:extLst>
+              <a:ext uri="{FF2B5EF4-FFF2-40B4-BE49-F238E27FC236}">
+                <a16:creationId xmlns:a16="http://schemas.microsoft.com/office/drawing/2014/main" id="{BB3689B3-20CA-F277-C486-74CA53A67CD4}"/>
+              </a:ext>
+            </a:extLst>
+          </p:cNvPr>
+          <p:cNvSpPr>
+            <a:spLocks noGrp="1"/>
+          </p:cNvSpPr>
+          <p:nvPr>
+            <p:ph type="title"/>
+          </p:nvPr>
+        </p:nvSpPr>
+        <p:spPr/>
+        <p:txBody>
+          <a:bodyPr/>
+          <a:lstStyle/>
+          <a:p>
+            <a:r>
+              <a:rPr lang="en-US" dirty="0"/>
+              <a:t>SQL Aggregate Functions</a:t>
+            </a:r>
+          </a:p>
+        </p:txBody>
+      </p:sp>
+      <p:sp>
+        <p:nvSpPr>
+          <p:cNvPr id="5" name="Rectangle 2">
+            <a:extLst>
+              <a:ext uri="{FF2B5EF4-FFF2-40B4-BE49-F238E27FC236}">
+                <a16:creationId xmlns:a16="http://schemas.microsoft.com/office/drawing/2014/main" id="{C6F0112C-82BD-EB72-43FA-CD994D61D602}"/>
+              </a:ext>
+            </a:extLst>
+          </p:cNvPr>
+          <p:cNvSpPr>
+            <a:spLocks noGrp="1" noChangeArrowheads="1"/>
+          </p:cNvSpPr>
+          <p:nvPr>
+            <p:ph idx="1"/>
+          </p:nvPr>
+        </p:nvSpPr>
+        <p:spPr bwMode="auto">
+          <a:xfrm>
+            <a:off x="838200" y="2022278"/>
+            <a:ext cx="10196946" cy="3785652"/>
+          </a:xfrm>
+          <a:prstGeom prst="rect">
+            <a:avLst/>
+          </a:prstGeom>
+          <a:solidFill>
+            <a:srgbClr val="FFFFFF"/>
+          </a:solidFill>
+          <a:ln>
+            <a:noFill/>
+          </a:ln>
+          <a:effectLst/>
+          <a:extLst>
+            <a:ext uri="{91240B29-F687-4F45-9708-019B960494DF}">
+              <a14:hiddenLine xmlns:a14="http://schemas.microsoft.com/office/drawing/2010/main" w="9525">
+                <a:solidFill>
+                  <a:schemeClr val="tx1"/>
+                </a:solidFill>
+                <a:miter lim="800000"/>
+                <a:headEnd/>
+                <a:tailEnd/>
+              </a14:hiddenLine>
+            </a:ext>
+            <a:ext uri="{AF507438-7753-43E0-B8FC-AC1667EBCBE1}">
+              <a14:hiddenEffects xmlns:a14="http://schemas.microsoft.com/office/drawing/2010/main">
+                <a:effectLst>
+                  <a:outerShdw dist="35921" dir="2700000" algn="ctr" rotWithShape="0">
+                    <a:schemeClr val="bg2"/>
+                  </a:outerShdw>
+                </a:effectLst>
+              </a14:hiddenEffects>
+            </a:ext>
+          </a:extLst>
+        </p:spPr>
+        <p:txBody>
+          <a:bodyPr vert="horz" wrap="square" lIns="91440" tIns="45720" rIns="91440" bIns="45720" numCol="1" anchor="ctr" anchorCtr="0" compatLnSpc="1">
+            <a:prstTxWarp prst="textNoShape">
+              <a:avLst/>
+            </a:prstTxWarp>
+            <a:spAutoFit/>
+          </a:bodyPr>
+          <a:lstStyle>
+            <a:lvl1pPr eaLnBrk="0" fontAlgn="base" hangingPunct="0">
+              <a:spcBef>
+                <a:spcPct val="0"/>
+              </a:spcBef>
+              <a:spcAft>
+                <a:spcPct val="0"/>
+              </a:spcAft>
+              <a:defRPr>
+                <a:solidFill>
+                  <a:schemeClr val="tx1"/>
+                </a:solidFill>
+                <a:latin typeface="Arial" panose="020B0604020202020204" pitchFamily="34" charset="0"/>
+              </a:defRPr>
+            </a:lvl1pPr>
+            <a:lvl2pPr eaLnBrk="0" fontAlgn="base" hangingPunct="0">
+              <a:spcBef>
+                <a:spcPct val="0"/>
+              </a:spcBef>
+              <a:spcAft>
+                <a:spcPct val="0"/>
+              </a:spcAft>
+              <a:defRPr>
+                <a:solidFill>
+                  <a:schemeClr val="tx1"/>
+                </a:solidFill>
+                <a:latin typeface="Arial" panose="020B0604020202020204" pitchFamily="34" charset="0"/>
+              </a:defRPr>
+            </a:lvl2pPr>
+            <a:lvl3pPr eaLnBrk="0" fontAlgn="base" hangingPunct="0">
+              <a:spcBef>
+                <a:spcPct val="0"/>
+              </a:spcBef>
+              <a:spcAft>
+                <a:spcPct val="0"/>
+              </a:spcAft>
+              <a:defRPr>
+                <a:solidFill>
+                  <a:schemeClr val="tx1"/>
+                </a:solidFill>
+                <a:latin typeface="Arial" panose="020B0604020202020204" pitchFamily="34" charset="0"/>
+              </a:defRPr>
+            </a:lvl3pPr>
+            <a:lvl4pPr eaLnBrk="0" fontAlgn="base" hangingPunct="0">
+              <a:spcBef>
+                <a:spcPct val="0"/>
+              </a:spcBef>
+              <a:spcAft>
+                <a:spcPct val="0"/>
+              </a:spcAft>
+              <a:defRPr>
+                <a:solidFill>
+                  <a:schemeClr val="tx1"/>
+                </a:solidFill>
+                <a:latin typeface="Arial" panose="020B0604020202020204" pitchFamily="34" charset="0"/>
+              </a:defRPr>
+            </a:lvl4pPr>
+            <a:lvl5pPr eaLnBrk="0" fontAlgn="base" hangingPunct="0">
+              <a:spcBef>
+                <a:spcPct val="0"/>
+              </a:spcBef>
+              <a:spcAft>
+                <a:spcPct val="0"/>
+              </a:spcAft>
+              <a:defRPr>
+                <a:solidFill>
+                  <a:schemeClr val="tx1"/>
+                </a:solidFill>
+                <a:latin typeface="Arial" panose="020B0604020202020204" pitchFamily="34" charset="0"/>
+              </a:defRPr>
+            </a:lvl5pPr>
+            <a:lvl6pPr eaLnBrk="0" fontAlgn="base" hangingPunct="0">
+              <a:spcBef>
+                <a:spcPct val="0"/>
+              </a:spcBef>
+              <a:spcAft>
+                <a:spcPct val="0"/>
+              </a:spcAft>
+              <a:defRPr>
+                <a:solidFill>
+                  <a:schemeClr val="tx1"/>
+                </a:solidFill>
+                <a:latin typeface="Arial" panose="020B0604020202020204" pitchFamily="34" charset="0"/>
+              </a:defRPr>
+            </a:lvl6pPr>
+            <a:lvl7pPr eaLnBrk="0" fontAlgn="base" hangingPunct="0">
+              <a:spcBef>
+                <a:spcPct val="0"/>
+              </a:spcBef>
+              <a:spcAft>
+                <a:spcPct val="0"/>
+              </a:spcAft>
+              <a:defRPr>
+                <a:solidFill>
+                  <a:schemeClr val="tx1"/>
+                </a:solidFill>
+                <a:latin typeface="Arial" panose="020B0604020202020204" pitchFamily="34" charset="0"/>
+              </a:defRPr>
+            </a:lvl7pPr>
+            <a:lvl8pPr eaLnBrk="0" fontAlgn="base" hangingPunct="0">
+              <a:spcBef>
+                <a:spcPct val="0"/>
+              </a:spcBef>
+              <a:spcAft>
+                <a:spcPct val="0"/>
+              </a:spcAft>
+              <a:defRPr>
+                <a:solidFill>
+                  <a:schemeClr val="tx1"/>
+                </a:solidFill>
+                <a:latin typeface="Arial" panose="020B0604020202020204" pitchFamily="34" charset="0"/>
+              </a:defRPr>
+            </a:lvl8pPr>
+            <a:lvl9pPr eaLnBrk="0" fontAlgn="base" hangingPunct="0">
+              <a:spcBef>
+                <a:spcPct val="0"/>
+              </a:spcBef>
+              <a:spcAft>
+                <a:spcPct val="0"/>
+              </a:spcAft>
+              <a:defRPr>
+                <a:solidFill>
+                  <a:schemeClr val="tx1"/>
+                </a:solidFill>
+                <a:latin typeface="Arial" panose="020B0604020202020204" pitchFamily="34" charset="0"/>
+              </a:defRPr>
+            </a:lvl9pPr>
+          </a:lstStyle>
+          <a:p>
+            <a:pPr marL="0" marR="0" lvl="0" indent="0" algn="l" defTabSz="914400" rtl="0" eaLnBrk="0" fontAlgn="base" latinLnBrk="0" hangingPunct="0">
+              <a:lnSpc>
+                <a:spcPct val="100000"/>
+              </a:lnSpc>
+              <a:spcBef>
+                <a:spcPct val="0"/>
+              </a:spcBef>
+              <a:spcAft>
+                <a:spcPct val="0"/>
+              </a:spcAft>
+              <a:buClrTx/>
+              <a:buSzTx/>
+              <a:buFontTx/>
+              <a:buNone/>
+              <a:tabLst/>
+            </a:pPr>
+            <a:r>
+              <a:rPr lang="en-US" altLang="en-US" sz="3000" dirty="0">
+                <a:latin typeface="Aptos (Body)"/>
+              </a:rPr>
+              <a:t>The most commonly used SQL aggregate functions are:</a:t>
+            </a:r>
+          </a:p>
+          <a:p>
+            <a:pPr marL="0" marR="0" lvl="0" indent="0" algn="l" defTabSz="914400" rtl="0" eaLnBrk="0" fontAlgn="base" latinLnBrk="0" hangingPunct="0">
+              <a:lnSpc>
+                <a:spcPct val="100000"/>
+              </a:lnSpc>
+              <a:spcBef>
+                <a:spcPct val="0"/>
+              </a:spcBef>
+              <a:spcAft>
+                <a:spcPct val="0"/>
+              </a:spcAft>
+              <a:buClrTx/>
+              <a:buSzTx/>
+              <a:buFontTx/>
+              <a:buNone/>
+              <a:tabLst/>
+            </a:pPr>
+            <a:endParaRPr lang="en-US" altLang="en-US" sz="3000" dirty="0">
+              <a:latin typeface="Aptos (Body)"/>
+            </a:endParaRPr>
+          </a:p>
+          <a:p>
+            <a:pPr marL="0" marR="0" lvl="0" indent="0" algn="l" defTabSz="914400" rtl="0" eaLnBrk="0" fontAlgn="base" latinLnBrk="0" hangingPunct="0">
+              <a:lnSpc>
+                <a:spcPct val="100000"/>
+              </a:lnSpc>
+              <a:spcBef>
+                <a:spcPct val="0"/>
+              </a:spcBef>
+              <a:spcAft>
+                <a:spcPct val="0"/>
+              </a:spcAft>
+              <a:buClrTx/>
+              <a:buSzTx/>
+              <a:buNone/>
+              <a:tabLst/>
+            </a:pPr>
+            <a:r>
+              <a:rPr lang="en-US" altLang="en-US" sz="3000" b="1" dirty="0">
+                <a:latin typeface="Aptos (Body)"/>
+              </a:rPr>
+              <a:t>MIN() </a:t>
+            </a:r>
+            <a:r>
+              <a:rPr lang="en-US" altLang="en-US" sz="3000" dirty="0">
+                <a:latin typeface="Aptos (Body)"/>
+              </a:rPr>
+              <a:t>- returns the smallest value within the selected column</a:t>
+            </a:r>
+          </a:p>
+          <a:p>
+            <a:pPr marL="0" marR="0" lvl="0" indent="0" algn="l" defTabSz="914400" rtl="0" eaLnBrk="0" fontAlgn="base" latinLnBrk="0" hangingPunct="0">
+              <a:lnSpc>
+                <a:spcPct val="100000"/>
+              </a:lnSpc>
+              <a:spcBef>
+                <a:spcPct val="0"/>
+              </a:spcBef>
+              <a:spcAft>
+                <a:spcPct val="0"/>
+              </a:spcAft>
+              <a:buClrTx/>
+              <a:buSzTx/>
+              <a:buNone/>
+              <a:tabLst/>
+            </a:pPr>
+            <a:r>
+              <a:rPr lang="en-US" altLang="en-US" sz="3000" b="1" dirty="0">
+                <a:latin typeface="Aptos (Body)"/>
+              </a:rPr>
+              <a:t>MAX() </a:t>
+            </a:r>
+            <a:r>
+              <a:rPr lang="en-US" altLang="en-US" sz="3000" dirty="0">
+                <a:latin typeface="Aptos (Body)"/>
+              </a:rPr>
+              <a:t>- returns the largest value within the selected column</a:t>
+            </a:r>
+          </a:p>
+          <a:p>
+            <a:pPr marL="0" marR="0" lvl="0" indent="0" algn="l" defTabSz="914400" rtl="0" eaLnBrk="0" fontAlgn="base" latinLnBrk="0" hangingPunct="0">
+              <a:lnSpc>
+                <a:spcPct val="100000"/>
+              </a:lnSpc>
+              <a:spcBef>
+                <a:spcPct val="0"/>
+              </a:spcBef>
+              <a:spcAft>
+                <a:spcPct val="0"/>
+              </a:spcAft>
+              <a:buClrTx/>
+              <a:buSzTx/>
+              <a:buNone/>
+              <a:tabLst/>
+            </a:pPr>
+            <a:r>
+              <a:rPr lang="en-US" altLang="en-US" sz="3000" b="1" dirty="0">
+                <a:latin typeface="Aptos (Body)"/>
+              </a:rPr>
+              <a:t>COUNT() </a:t>
+            </a:r>
+            <a:r>
+              <a:rPr lang="en-US" altLang="en-US" sz="3000" dirty="0">
+                <a:latin typeface="Aptos (Body)"/>
+              </a:rPr>
+              <a:t>- returns the number of rows in a set</a:t>
+            </a:r>
+          </a:p>
+          <a:p>
+            <a:pPr marL="0" marR="0" lvl="0" indent="0" algn="l" defTabSz="914400" rtl="0" eaLnBrk="0" fontAlgn="base" latinLnBrk="0" hangingPunct="0">
+              <a:lnSpc>
+                <a:spcPct val="100000"/>
+              </a:lnSpc>
+              <a:spcBef>
+                <a:spcPct val="0"/>
+              </a:spcBef>
+              <a:spcAft>
+                <a:spcPct val="0"/>
+              </a:spcAft>
+              <a:buClrTx/>
+              <a:buSzTx/>
+              <a:buNone/>
+              <a:tabLst/>
+            </a:pPr>
+            <a:r>
+              <a:rPr lang="en-US" altLang="en-US" sz="3000" b="1" dirty="0">
+                <a:latin typeface="Aptos (Body)"/>
+              </a:rPr>
+              <a:t>SUM() </a:t>
+            </a:r>
+            <a:r>
+              <a:rPr lang="en-US" altLang="en-US" sz="3000" dirty="0">
+                <a:latin typeface="Aptos (Body)"/>
+              </a:rPr>
+              <a:t>- returns the total sum of a numerical column</a:t>
+            </a:r>
+          </a:p>
+          <a:p>
+            <a:pPr marL="0" marR="0" lvl="0" indent="0" algn="l" defTabSz="914400" rtl="0" eaLnBrk="0" fontAlgn="base" latinLnBrk="0" hangingPunct="0">
+              <a:lnSpc>
+                <a:spcPct val="100000"/>
+              </a:lnSpc>
+              <a:spcBef>
+                <a:spcPct val="0"/>
+              </a:spcBef>
+              <a:spcAft>
+                <a:spcPct val="0"/>
+              </a:spcAft>
+              <a:buClrTx/>
+              <a:buSzTx/>
+              <a:buNone/>
+              <a:tabLst/>
+            </a:pPr>
+            <a:r>
+              <a:rPr lang="en-US" altLang="en-US" sz="3000" b="1" dirty="0">
+                <a:latin typeface="Aptos (Body)"/>
+              </a:rPr>
+              <a:t>AVG() </a:t>
+            </a:r>
+            <a:r>
+              <a:rPr lang="en-US" altLang="en-US" sz="3000" dirty="0">
+                <a:latin typeface="Aptos (Body)"/>
+              </a:rPr>
+              <a:t>- returns the average value of a numerical column</a:t>
+            </a:r>
+          </a:p>
+          <a:p>
+            <a:pPr marL="0" marR="0" lvl="0" indent="0" algn="l" defTabSz="914400" rtl="0" eaLnBrk="0" fontAlgn="base" latinLnBrk="0" hangingPunct="0">
+              <a:lnSpc>
+                <a:spcPct val="100000"/>
+              </a:lnSpc>
+              <a:spcBef>
+                <a:spcPct val="0"/>
+              </a:spcBef>
+              <a:spcAft>
+                <a:spcPct val="0"/>
+              </a:spcAft>
+              <a:buClrTx/>
+              <a:buSzTx/>
+              <a:buFontTx/>
+              <a:buNone/>
+              <a:tabLst/>
+            </a:pPr>
+            <a:endParaRPr lang="en-US" altLang="en-US" sz="3000" dirty="0">
+              <a:latin typeface="Aptos (Body)"/>
+            </a:endParaRPr>
+          </a:p>
+        </p:txBody>
+      </p:sp>
+    </p:spTree>
+    <p:extLst>
+      <p:ext uri="{BB962C8B-B14F-4D97-AF65-F5344CB8AC3E}">
+        <p14:creationId xmlns:p14="http://schemas.microsoft.com/office/powerpoint/2010/main" val="1447234720"/>
+      </p:ext>
+    </p:extLst>
+  </p:cSld>
+  <p:clrMapOvr>
+    <a:masterClrMapping/>
+  </p:clrMapOvr>
+</p:sld>
+</file>
+
+<file path=ppt/slides/slide5.xml><?xml version="1.0" encoding="utf-8"?>
 <p:sld xmlns:a="http://schemas.openxmlformats.org/drawingml/2006/main" xmlns:r="http://schemas.openxmlformats.org/officeDocument/2006/relationships" xmlns:p="http://schemas.openxmlformats.org/presentationml/2006/main" showMasterSp="0">
   <p:cSld>
     <p:spTree>
@@ -22672,7 +24761,7 @@
 </p:sld>
 </file>
 
-<file path=ppt/slides/slide5.xml><?xml version="1.0" encoding="utf-8"?>
+<file path=ppt/slides/slide6.xml><?xml version="1.0" encoding="utf-8"?>
 <p:sld xmlns:a="http://schemas.openxmlformats.org/drawingml/2006/main" xmlns:r="http://schemas.openxmlformats.org/officeDocument/2006/relationships" xmlns:p="http://schemas.openxmlformats.org/presentationml/2006/main" showMasterSp="0">
   <p:cSld>
     <p:spTree>
@@ -23828,7 +25917,7 @@
 </p:sld>
 </file>
 
-<file path=ppt/slides/slide6.xml><?xml version="1.0" encoding="utf-8"?>
+<file path=ppt/slides/slide7.xml><?xml version="1.0" encoding="utf-8"?>
 <p:sld xmlns:a="http://schemas.openxmlformats.org/drawingml/2006/main" xmlns:r="http://schemas.openxmlformats.org/officeDocument/2006/relationships" xmlns:p="http://schemas.openxmlformats.org/presentationml/2006/main" showMasterSp="0">
   <p:cSld>
     <p:spTree>
@@ -25086,7 +27175,7 @@
 </p:sld>
 </file>
 
-<file path=ppt/slides/slide7.xml><?xml version="1.0" encoding="utf-8"?>
+<file path=ppt/slides/slide8.xml><?xml version="1.0" encoding="utf-8"?>
 <p:sld xmlns:a="http://schemas.openxmlformats.org/drawingml/2006/main" xmlns:r="http://schemas.openxmlformats.org/officeDocument/2006/relationships" xmlns:p="http://schemas.openxmlformats.org/presentationml/2006/main" showMasterSp="0">
   <p:cSld>
     <p:spTree>
@@ -26344,7 +28433,7 @@
 </p:sld>
 </file>
 
-<file path=ppt/slides/slide8.xml><?xml version="1.0" encoding="utf-8"?>
+<file path=ppt/slides/slide9.xml><?xml version="1.0" encoding="utf-8"?>
 <p:sld xmlns:a="http://schemas.openxmlformats.org/drawingml/2006/main" xmlns:r="http://schemas.openxmlformats.org/officeDocument/2006/relationships" xmlns:p="http://schemas.openxmlformats.org/presentationml/2006/main" showMasterSp="0">
   <p:cSld>
     <p:spTree>
@@ -27399,1156 +29488,6 @@
     <p:extLst>
       <p:ext uri="{BB962C8B-B14F-4D97-AF65-F5344CB8AC3E}">
         <p14:creationId xmlns:p14="http://schemas.microsoft.com/office/powerpoint/2010/main" val="3254577242"/>
-      </p:ext>
-    </p:extLst>
-  </p:cSld>
-  <p:clrMapOvr>
-    <a:masterClrMapping/>
-  </p:clrMapOvr>
-  <p:timing>
-    <p:tnLst>
-      <p:par>
-        <p:cTn id="1" dur="indefinite" restart="never" nodeType="tmRoot">
-          <p:childTnLst>
-            <p:seq concurrent="1" nextAc="seek">
-              <p:cTn id="2" dur="indefinite" nodeType="mainSeq">
-                <p:childTnLst>
-                  <p:par>
-                    <p:cTn id="3" fill="hold">
-                      <p:stCondLst>
-                        <p:cond delay="indefinite"/>
-                      </p:stCondLst>
-                      <p:childTnLst>
-                        <p:par>
-                          <p:cTn id="4" fill="hold">
-                            <p:stCondLst>
-                              <p:cond delay="0"/>
-                            </p:stCondLst>
-                            <p:childTnLst>
-                              <p:par>
-                                <p:cTn id="5" presetID="10" presetClass="entr" presetSubtype="0" fill="hold" grpId="0" nodeType="clickEffect">
-                                  <p:stCondLst>
-                                    <p:cond delay="0"/>
-                                  </p:stCondLst>
-                                  <p:childTnLst>
-                                    <p:set>
-                                      <p:cBhvr>
-                                        <p:cTn id="6" dur="1" fill="hold">
-                                          <p:stCondLst>
-                                            <p:cond delay="0"/>
-                                          </p:stCondLst>
-                                        </p:cTn>
-                                        <p:tgtEl>
-                                          <p:spTgt spid="5"/>
-                                        </p:tgtEl>
-                                        <p:attrNameLst>
-                                          <p:attrName>style.visibility</p:attrName>
-                                        </p:attrNameLst>
-                                      </p:cBhvr>
-                                      <p:to>
-                                        <p:strVal val="visible"/>
-                                      </p:to>
-                                    </p:set>
-                                    <p:animEffect transition="in" filter="fade">
-                                      <p:cBhvr>
-                                        <p:cTn id="7" dur="500"/>
-                                        <p:tgtEl>
-                                          <p:spTgt spid="5"/>
-                                        </p:tgtEl>
-                                      </p:cBhvr>
-                                    </p:animEffect>
-                                  </p:childTnLst>
-                                </p:cTn>
-                              </p:par>
-                            </p:childTnLst>
-                          </p:cTn>
-                        </p:par>
-                      </p:childTnLst>
-                    </p:cTn>
-                  </p:par>
-                </p:childTnLst>
-              </p:cTn>
-              <p:prevCondLst>
-                <p:cond evt="onPrev" delay="0">
-                  <p:tgtEl>
-                    <p:sldTgt/>
-                  </p:tgtEl>
-                </p:cond>
-              </p:prevCondLst>
-              <p:nextCondLst>
-                <p:cond evt="onNext" delay="0">
-                  <p:tgtEl>
-                    <p:sldTgt/>
-                  </p:tgtEl>
-                </p:cond>
-              </p:nextCondLst>
-            </p:seq>
-          </p:childTnLst>
-        </p:cTn>
-      </p:par>
-    </p:tnLst>
-    <p:bldLst>
-      <p:bldP spid="5" grpId="0"/>
-    </p:bldLst>
-  </p:timing>
-</p:sld>
-</file>
-
-<file path=ppt/slides/slide9.xml><?xml version="1.0" encoding="utf-8"?>
-<p:sld xmlns:a="http://schemas.openxmlformats.org/drawingml/2006/main" xmlns:r="http://schemas.openxmlformats.org/officeDocument/2006/relationships" xmlns:p="http://schemas.openxmlformats.org/presentationml/2006/main" showMasterSp="0">
-  <p:cSld>
-    <p:spTree>
-      <p:nvGrpSpPr>
-        <p:cNvPr id="1" name="">
-          <a:extLst>
-            <a:ext uri="{FF2B5EF4-FFF2-40B4-BE49-F238E27FC236}">
-              <a16:creationId xmlns:a16="http://schemas.microsoft.com/office/drawing/2014/main" id="{6B4B3633-837D-3F67-9A97-B068931CD29C}"/>
-            </a:ext>
-          </a:extLst>
-        </p:cNvPr>
-        <p:cNvGrpSpPr/>
-        <p:nvPr/>
-      </p:nvGrpSpPr>
-      <p:grpSpPr>
-        <a:xfrm>
-          <a:off x="0" y="0"/>
-          <a:ext cx="0" cy="0"/>
-          <a:chOff x="0" y="0"/>
-          <a:chExt cx="0" cy="0"/>
-        </a:xfrm>
-      </p:grpSpPr>
-      <p:graphicFrame>
-        <p:nvGraphicFramePr>
-          <p:cNvPr id="23" name="Table 22">
-            <a:extLst>
-              <a:ext uri="{FF2B5EF4-FFF2-40B4-BE49-F238E27FC236}">
-                <a16:creationId xmlns:a16="http://schemas.microsoft.com/office/drawing/2014/main" id="{4FEA5446-6A84-73EF-4583-897A2A274B93}"/>
-              </a:ext>
-            </a:extLst>
-          </p:cNvPr>
-          <p:cNvGraphicFramePr>
-            <a:graphicFrameLocks noGrp="1"/>
-          </p:cNvGraphicFramePr>
-          <p:nvPr/>
-        </p:nvGraphicFramePr>
-        <p:xfrm>
-          <a:off x="247286" y="283616"/>
-          <a:ext cx="5748320" cy="3046110"/>
-        </p:xfrm>
-        <a:graphic>
-          <a:graphicData uri="http://schemas.openxmlformats.org/drawingml/2006/table">
-            <a:tbl>
-              <a:tblPr firstRow="1" bandRow="1">
-                <a:tableStyleId>{5940675A-B579-460E-94D1-54222C63F5DA}</a:tableStyleId>
-              </a:tblPr>
-              <a:tblGrid>
-                <a:gridCol w="1437080">
-                  <a:extLst>
-                    <a:ext uri="{9D8B030D-6E8A-4147-A177-3AD203B41FA5}">
-                      <a16:colId xmlns:a16="http://schemas.microsoft.com/office/drawing/2014/main" val="3058387547"/>
-                    </a:ext>
-                  </a:extLst>
-                </a:gridCol>
-                <a:gridCol w="1437080">
-                  <a:extLst>
-                    <a:ext uri="{9D8B030D-6E8A-4147-A177-3AD203B41FA5}">
-                      <a16:colId xmlns:a16="http://schemas.microsoft.com/office/drawing/2014/main" val="4203511651"/>
-                    </a:ext>
-                  </a:extLst>
-                </a:gridCol>
-                <a:gridCol w="1437080">
-                  <a:extLst>
-                    <a:ext uri="{9D8B030D-6E8A-4147-A177-3AD203B41FA5}">
-                      <a16:colId xmlns:a16="http://schemas.microsoft.com/office/drawing/2014/main" val="1098043855"/>
-                    </a:ext>
-                  </a:extLst>
-                </a:gridCol>
-                <a:gridCol w="1437080">
-                  <a:extLst>
-                    <a:ext uri="{9D8B030D-6E8A-4147-A177-3AD203B41FA5}">
-                      <a16:colId xmlns:a16="http://schemas.microsoft.com/office/drawing/2014/main" val="1582278893"/>
-                    </a:ext>
-                  </a:extLst>
-                </a:gridCol>
-              </a:tblGrid>
-              <a:tr h="373155">
-                <a:tc gridSpan="4">
-                  <a:txBody>
-                    <a:bodyPr/>
-                    <a:lstStyle/>
-                    <a:p>
-                      <a:pPr marL="0" marR="0" lvl="0" indent="0" algn="ctr" defTabSz="914400" rtl="0" eaLnBrk="1" fontAlgn="auto" latinLnBrk="0" hangingPunct="1">
-                        <a:lnSpc>
-                          <a:spcPct val="100000"/>
-                        </a:lnSpc>
-                        <a:spcBef>
-                          <a:spcPts val="0"/>
-                        </a:spcBef>
-                        <a:spcAft>
-                          <a:spcPts val="0"/>
-                        </a:spcAft>
-                        <a:buClrTx/>
-                        <a:buSzTx/>
-                        <a:buFontTx/>
-                        <a:buNone/>
-                        <a:tabLst/>
-                        <a:defRPr/>
-                      </a:pPr>
-                      <a:r>
-                        <a:rPr lang="en-PH" sz="1500" b="1" dirty="0"/>
-                        <a:t>transactions</a:t>
-                      </a:r>
-                    </a:p>
-                  </a:txBody>
-                  <a:tcPr anchor="ctr">
-                    <a:solidFill>
-                      <a:srgbClr val="9999FF"/>
-                    </a:solidFill>
-                  </a:tcPr>
-                </a:tc>
-                <a:tc hMerge="1">
-                  <a:txBody>
-                    <a:bodyPr/>
-                    <a:lstStyle/>
-                    <a:p>
-                      <a:pPr algn="ctr"/>
-                      <a:endParaRPr lang="en-PH" sz="1500" b="1" dirty="0"/>
-                    </a:p>
-                  </a:txBody>
-                  <a:tcPr anchor="ctr">
-                    <a:solidFill>
-                      <a:schemeClr val="accent4">
-                        <a:lumMod val="40000"/>
-                        <a:lumOff val="60000"/>
-                      </a:schemeClr>
-                    </a:solidFill>
-                  </a:tcPr>
-                </a:tc>
-                <a:tc hMerge="1">
-                  <a:txBody>
-                    <a:bodyPr/>
-                    <a:lstStyle/>
-                    <a:p>
-                      <a:pPr algn="ctr"/>
-                      <a:endParaRPr lang="en-PH" sz="1500" b="1" dirty="0"/>
-                    </a:p>
-                  </a:txBody>
-                  <a:tcPr anchor="ctr">
-                    <a:solidFill>
-                      <a:schemeClr val="accent4">
-                        <a:lumMod val="40000"/>
-                        <a:lumOff val="60000"/>
-                      </a:schemeClr>
-                    </a:solidFill>
-                  </a:tcPr>
-                </a:tc>
-                <a:tc hMerge="1">
-                  <a:txBody>
-                    <a:bodyPr/>
-                    <a:lstStyle/>
-                    <a:p>
-                      <a:pPr marL="0" marR="0" lvl="0" indent="0" algn="ctr" defTabSz="914400" rtl="0" eaLnBrk="1" fontAlgn="auto" latinLnBrk="0" hangingPunct="1">
-                        <a:lnSpc>
-                          <a:spcPct val="100000"/>
-                        </a:lnSpc>
-                        <a:spcBef>
-                          <a:spcPts val="0"/>
-                        </a:spcBef>
-                        <a:spcAft>
-                          <a:spcPts val="0"/>
-                        </a:spcAft>
-                        <a:buClrTx/>
-                        <a:buSzTx/>
-                        <a:buFontTx/>
-                        <a:buNone/>
-                        <a:tabLst/>
-                        <a:defRPr/>
-                      </a:pPr>
-                      <a:endParaRPr lang="en-PH" sz="1500" b="1" dirty="0"/>
-                    </a:p>
-                  </a:txBody>
-                  <a:tcPr anchor="ctr">
-                    <a:solidFill>
-                      <a:srgbClr val="9999FF"/>
-                    </a:solidFill>
-                  </a:tcPr>
-                </a:tc>
-                <a:extLst>
-                  <a:ext uri="{0D108BD9-81ED-4DB2-BD59-A6C34878D82A}">
-                    <a16:rowId xmlns:a16="http://schemas.microsoft.com/office/drawing/2014/main" val="1755305712"/>
-                  </a:ext>
-                </a:extLst>
-              </a:tr>
-              <a:tr h="373155">
-                <a:tc>
-                  <a:txBody>
-                    <a:bodyPr/>
-                    <a:lstStyle/>
-                    <a:p>
-                      <a:pPr marL="0" marR="0" lvl="0" indent="0" algn="ctr" defTabSz="914400" rtl="0" eaLnBrk="1" fontAlgn="auto" latinLnBrk="0" hangingPunct="1">
-                        <a:lnSpc>
-                          <a:spcPct val="100000"/>
-                        </a:lnSpc>
-                        <a:spcBef>
-                          <a:spcPts val="0"/>
-                        </a:spcBef>
-                        <a:spcAft>
-                          <a:spcPts val="0"/>
-                        </a:spcAft>
-                        <a:buClrTx/>
-                        <a:buSzTx/>
-                        <a:buFontTx/>
-                        <a:buNone/>
-                        <a:tabLst/>
-                        <a:defRPr/>
-                      </a:pPr>
-                      <a:r>
-                        <a:rPr lang="en-PH" sz="1500" b="1" dirty="0" err="1"/>
-                        <a:t>transaction_id</a:t>
-                      </a:r>
-                      <a:endParaRPr lang="en-PH" sz="1500" b="1" dirty="0"/>
-                    </a:p>
-                  </a:txBody>
-                  <a:tcPr anchor="ctr">
-                    <a:solidFill>
-                      <a:schemeClr val="accent4">
-                        <a:lumMod val="40000"/>
-                        <a:lumOff val="60000"/>
-                      </a:schemeClr>
-                    </a:solidFill>
-                  </a:tcPr>
-                </a:tc>
-                <a:tc>
-                  <a:txBody>
-                    <a:bodyPr/>
-                    <a:lstStyle/>
-                    <a:p>
-                      <a:pPr algn="ctr"/>
-                      <a:r>
-                        <a:rPr lang="en-PH" sz="1500" b="1" dirty="0"/>
-                        <a:t>amount</a:t>
-                      </a:r>
-                    </a:p>
-                  </a:txBody>
-                  <a:tcPr anchor="ctr">
-                    <a:solidFill>
-                      <a:schemeClr val="accent4">
-                        <a:lumMod val="40000"/>
-                        <a:lumOff val="60000"/>
-                      </a:schemeClr>
-                    </a:solidFill>
-                  </a:tcPr>
-                </a:tc>
-                <a:tc>
-                  <a:txBody>
-                    <a:bodyPr/>
-                    <a:lstStyle/>
-                    <a:p>
-                      <a:pPr marL="0" marR="0" lvl="0" indent="0" algn="ctr" defTabSz="914400" rtl="0" eaLnBrk="1" fontAlgn="auto" latinLnBrk="0" hangingPunct="1">
-                        <a:lnSpc>
-                          <a:spcPct val="100000"/>
-                        </a:lnSpc>
-                        <a:spcBef>
-                          <a:spcPts val="0"/>
-                        </a:spcBef>
-                        <a:spcAft>
-                          <a:spcPts val="0"/>
-                        </a:spcAft>
-                        <a:buClrTx/>
-                        <a:buSzTx/>
-                        <a:buFontTx/>
-                        <a:buNone/>
-                        <a:tabLst/>
-                        <a:defRPr/>
-                      </a:pPr>
-                      <a:r>
-                        <a:rPr lang="en-PH" sz="1500" b="1" dirty="0" err="1"/>
-                        <a:t>customer_id</a:t>
-                      </a:r>
-                      <a:endParaRPr lang="en-PH" sz="1500" b="1" dirty="0"/>
-                    </a:p>
-                  </a:txBody>
-                  <a:tcPr anchor="ctr">
-                    <a:solidFill>
-                      <a:schemeClr val="accent4">
-                        <a:lumMod val="40000"/>
-                        <a:lumOff val="60000"/>
-                      </a:schemeClr>
-                    </a:solidFill>
-                  </a:tcPr>
-                </a:tc>
-                <a:tc>
-                  <a:txBody>
-                    <a:bodyPr/>
-                    <a:lstStyle/>
-                    <a:p>
-                      <a:pPr marL="0" marR="0" lvl="0" indent="0" algn="ctr" defTabSz="914400" rtl="0" eaLnBrk="1" fontAlgn="auto" latinLnBrk="0" hangingPunct="1">
-                        <a:lnSpc>
-                          <a:spcPct val="100000"/>
-                        </a:lnSpc>
-                        <a:spcBef>
-                          <a:spcPts val="0"/>
-                        </a:spcBef>
-                        <a:spcAft>
-                          <a:spcPts val="0"/>
-                        </a:spcAft>
-                        <a:buClrTx/>
-                        <a:buSzTx/>
-                        <a:buFontTx/>
-                        <a:buNone/>
-                        <a:tabLst/>
-                        <a:defRPr/>
-                      </a:pPr>
-                      <a:r>
-                        <a:rPr lang="en-PH" sz="1500" b="1" dirty="0" err="1"/>
-                        <a:t>order_date</a:t>
-                      </a:r>
-                      <a:endParaRPr lang="en-PH" sz="1500" b="1" dirty="0"/>
-                    </a:p>
-                  </a:txBody>
-                  <a:tcPr anchor="ctr">
-                    <a:solidFill>
-                      <a:schemeClr val="accent4">
-                        <a:lumMod val="40000"/>
-                        <a:lumOff val="60000"/>
-                      </a:schemeClr>
-                    </a:solidFill>
-                  </a:tcPr>
-                </a:tc>
-                <a:extLst>
-                  <a:ext uri="{0D108BD9-81ED-4DB2-BD59-A6C34878D82A}">
-                    <a16:rowId xmlns:a16="http://schemas.microsoft.com/office/drawing/2014/main" val="2556140539"/>
-                  </a:ext>
-                </a:extLst>
-              </a:tr>
-              <a:tr h="459960">
-                <a:tc>
-                  <a:txBody>
-                    <a:bodyPr/>
-                    <a:lstStyle/>
-                    <a:p>
-                      <a:pPr algn="ctr"/>
-                      <a:r>
-                        <a:rPr lang="en-PH" dirty="0"/>
-                        <a:t>1000</a:t>
-                      </a:r>
-                    </a:p>
-                  </a:txBody>
-                  <a:tcPr anchor="ctr"/>
-                </a:tc>
-                <a:tc>
-                  <a:txBody>
-                    <a:bodyPr/>
-                    <a:lstStyle/>
-                    <a:p>
-                      <a:pPr algn="ctr"/>
-                      <a:r>
-                        <a:rPr lang="en-PH" dirty="0"/>
-                        <a:t>4.99</a:t>
-                      </a:r>
-                    </a:p>
-                  </a:txBody>
-                  <a:tcPr anchor="ctr"/>
-                </a:tc>
-                <a:tc>
-                  <a:txBody>
-                    <a:bodyPr/>
-                    <a:lstStyle/>
-                    <a:p>
-                      <a:pPr algn="ctr"/>
-                      <a:r>
-                        <a:rPr lang="en-PH" dirty="0"/>
-                        <a:t>3</a:t>
-                      </a:r>
-                    </a:p>
-                  </a:txBody>
-                  <a:tcPr anchor="ctr"/>
-                </a:tc>
-                <a:tc>
-                  <a:txBody>
-                    <a:bodyPr/>
-                    <a:lstStyle/>
-                    <a:p>
-                      <a:pPr algn="ctr"/>
-                      <a:r>
-                        <a:rPr lang="en-PH" dirty="0"/>
-                        <a:t>2025-01-01</a:t>
-                      </a:r>
-                    </a:p>
-                  </a:txBody>
-                  <a:tcPr anchor="ctr"/>
-                </a:tc>
-                <a:extLst>
-                  <a:ext uri="{0D108BD9-81ED-4DB2-BD59-A6C34878D82A}">
-                    <a16:rowId xmlns:a16="http://schemas.microsoft.com/office/drawing/2014/main" val="3326491140"/>
-                  </a:ext>
-                </a:extLst>
-              </a:tr>
-              <a:tr h="459960">
-                <a:tc>
-                  <a:txBody>
-                    <a:bodyPr/>
-                    <a:lstStyle/>
-                    <a:p>
-                      <a:pPr algn="ctr"/>
-                      <a:r>
-                        <a:rPr lang="en-PH" dirty="0"/>
-                        <a:t>1001</a:t>
-                      </a:r>
-                    </a:p>
-                  </a:txBody>
-                  <a:tcPr anchor="ctr"/>
-                </a:tc>
-                <a:tc>
-                  <a:txBody>
-                    <a:bodyPr/>
-                    <a:lstStyle/>
-                    <a:p>
-                      <a:pPr algn="ctr"/>
-                      <a:r>
-                        <a:rPr lang="en-PH" dirty="0"/>
-                        <a:t>2.89</a:t>
-                      </a:r>
-                    </a:p>
-                  </a:txBody>
-                  <a:tcPr anchor="ctr"/>
-                </a:tc>
-                <a:tc>
-                  <a:txBody>
-                    <a:bodyPr/>
-                    <a:lstStyle/>
-                    <a:p>
-                      <a:pPr algn="ctr"/>
-                      <a:r>
-                        <a:rPr lang="en-PH" dirty="0"/>
-                        <a:t>2</a:t>
-                      </a:r>
-                    </a:p>
-                  </a:txBody>
-                  <a:tcPr anchor="ctr"/>
-                </a:tc>
-                <a:tc>
-                  <a:txBody>
-                    <a:bodyPr/>
-                    <a:lstStyle/>
-                    <a:p>
-                      <a:pPr marL="0" marR="0" lvl="0" indent="0" algn="ctr" defTabSz="914400" rtl="0" eaLnBrk="1" fontAlgn="auto" latinLnBrk="0" hangingPunct="1">
-                        <a:lnSpc>
-                          <a:spcPct val="100000"/>
-                        </a:lnSpc>
-                        <a:spcBef>
-                          <a:spcPts val="0"/>
-                        </a:spcBef>
-                        <a:spcAft>
-                          <a:spcPts val="0"/>
-                        </a:spcAft>
-                        <a:buClrTx/>
-                        <a:buSzTx/>
-                        <a:buFontTx/>
-                        <a:buNone/>
-                        <a:tabLst/>
-                        <a:defRPr/>
-                      </a:pPr>
-                      <a:r>
-                        <a:rPr lang="en-PH" dirty="0"/>
-                        <a:t>2025-01-01</a:t>
-                      </a:r>
-                    </a:p>
-                  </a:txBody>
-                  <a:tcPr anchor="ctr"/>
-                </a:tc>
-                <a:extLst>
-                  <a:ext uri="{0D108BD9-81ED-4DB2-BD59-A6C34878D82A}">
-                    <a16:rowId xmlns:a16="http://schemas.microsoft.com/office/drawing/2014/main" val="2648341168"/>
-                  </a:ext>
-                </a:extLst>
-              </a:tr>
-              <a:tr h="459960">
-                <a:tc>
-                  <a:txBody>
-                    <a:bodyPr/>
-                    <a:lstStyle/>
-                    <a:p>
-                      <a:pPr algn="ctr"/>
-                      <a:r>
-                        <a:rPr lang="en-PH" dirty="0"/>
-                        <a:t>1002</a:t>
-                      </a:r>
-                    </a:p>
-                  </a:txBody>
-                  <a:tcPr anchor="ctr"/>
-                </a:tc>
-                <a:tc>
-                  <a:txBody>
-                    <a:bodyPr/>
-                    <a:lstStyle/>
-                    <a:p>
-                      <a:pPr algn="ctr"/>
-                      <a:r>
-                        <a:rPr lang="en-PH" dirty="0"/>
-                        <a:t>3.38</a:t>
-                      </a:r>
-                    </a:p>
-                  </a:txBody>
-                  <a:tcPr anchor="ctr"/>
-                </a:tc>
-                <a:tc>
-                  <a:txBody>
-                    <a:bodyPr/>
-                    <a:lstStyle/>
-                    <a:p>
-                      <a:pPr algn="ctr"/>
-                      <a:r>
-                        <a:rPr lang="en-PH" dirty="0"/>
-                        <a:t>3</a:t>
-                      </a:r>
-                    </a:p>
-                  </a:txBody>
-                  <a:tcPr anchor="ctr"/>
-                </a:tc>
-                <a:tc>
-                  <a:txBody>
-                    <a:bodyPr/>
-                    <a:lstStyle/>
-                    <a:p>
-                      <a:pPr marL="0" marR="0" lvl="0" indent="0" algn="ctr" defTabSz="914400" rtl="0" eaLnBrk="1" fontAlgn="auto" latinLnBrk="0" hangingPunct="1">
-                        <a:lnSpc>
-                          <a:spcPct val="100000"/>
-                        </a:lnSpc>
-                        <a:spcBef>
-                          <a:spcPts val="0"/>
-                        </a:spcBef>
-                        <a:spcAft>
-                          <a:spcPts val="0"/>
-                        </a:spcAft>
-                        <a:buClrTx/>
-                        <a:buSzTx/>
-                        <a:buFontTx/>
-                        <a:buNone/>
-                        <a:tabLst/>
-                        <a:defRPr/>
-                      </a:pPr>
-                      <a:r>
-                        <a:rPr lang="en-PH" dirty="0"/>
-                        <a:t>2025-01-02</a:t>
-                      </a:r>
-                    </a:p>
-                  </a:txBody>
-                  <a:tcPr anchor="ctr"/>
-                </a:tc>
-                <a:extLst>
-                  <a:ext uri="{0D108BD9-81ED-4DB2-BD59-A6C34878D82A}">
-                    <a16:rowId xmlns:a16="http://schemas.microsoft.com/office/drawing/2014/main" val="1017284182"/>
-                  </a:ext>
-                </a:extLst>
-              </a:tr>
-              <a:tr h="459960">
-                <a:tc>
-                  <a:txBody>
-                    <a:bodyPr/>
-                    <a:lstStyle/>
-                    <a:p>
-                      <a:pPr algn="ctr"/>
-                      <a:r>
-                        <a:rPr lang="en-PH" dirty="0"/>
-                        <a:t>1003</a:t>
-                      </a:r>
-                    </a:p>
-                  </a:txBody>
-                  <a:tcPr anchor="ctr"/>
-                </a:tc>
-                <a:tc>
-                  <a:txBody>
-                    <a:bodyPr/>
-                    <a:lstStyle/>
-                    <a:p>
-                      <a:pPr algn="ctr"/>
-                      <a:r>
-                        <a:rPr lang="en-PH" dirty="0"/>
-                        <a:t>4.99</a:t>
-                      </a:r>
-                    </a:p>
-                  </a:txBody>
-                  <a:tcPr anchor="ctr"/>
-                </a:tc>
-                <a:tc>
-                  <a:txBody>
-                    <a:bodyPr/>
-                    <a:lstStyle/>
-                    <a:p>
-                      <a:pPr algn="ctr"/>
-                      <a:r>
-                        <a:rPr lang="en-PH" dirty="0"/>
-                        <a:t>1</a:t>
-                      </a:r>
-                    </a:p>
-                  </a:txBody>
-                  <a:tcPr anchor="ctr"/>
-                </a:tc>
-                <a:tc>
-                  <a:txBody>
-                    <a:bodyPr/>
-                    <a:lstStyle/>
-                    <a:p>
-                      <a:pPr marL="0" marR="0" lvl="0" indent="0" algn="ctr" defTabSz="914400" rtl="0" eaLnBrk="1" fontAlgn="auto" latinLnBrk="0" hangingPunct="1">
-                        <a:lnSpc>
-                          <a:spcPct val="100000"/>
-                        </a:lnSpc>
-                        <a:spcBef>
-                          <a:spcPts val="0"/>
-                        </a:spcBef>
-                        <a:spcAft>
-                          <a:spcPts val="0"/>
-                        </a:spcAft>
-                        <a:buClrTx/>
-                        <a:buSzTx/>
-                        <a:buFontTx/>
-                        <a:buNone/>
-                        <a:tabLst/>
-                        <a:defRPr/>
-                      </a:pPr>
-                      <a:r>
-                        <a:rPr lang="en-PH" dirty="0"/>
-                        <a:t>2025-01-02</a:t>
-                      </a:r>
-                    </a:p>
-                  </a:txBody>
-                  <a:tcPr anchor="ctr"/>
-                </a:tc>
-                <a:extLst>
-                  <a:ext uri="{0D108BD9-81ED-4DB2-BD59-A6C34878D82A}">
-                    <a16:rowId xmlns:a16="http://schemas.microsoft.com/office/drawing/2014/main" val="3361133543"/>
-                  </a:ext>
-                </a:extLst>
-              </a:tr>
-              <a:tr h="459960">
-                <a:tc>
-                  <a:txBody>
-                    <a:bodyPr/>
-                    <a:lstStyle/>
-                    <a:p>
-                      <a:pPr algn="ctr"/>
-                      <a:r>
-                        <a:rPr lang="en-PH" dirty="0"/>
-                        <a:t>1004</a:t>
-                      </a:r>
-                    </a:p>
-                  </a:txBody>
-                  <a:tcPr anchor="ctr"/>
-                </a:tc>
-                <a:tc>
-                  <a:txBody>
-                    <a:bodyPr/>
-                    <a:lstStyle/>
-                    <a:p>
-                      <a:pPr algn="ctr"/>
-                      <a:r>
-                        <a:rPr lang="en-PH" dirty="0"/>
-                        <a:t>1.00</a:t>
-                      </a:r>
-                    </a:p>
-                  </a:txBody>
-                  <a:tcPr anchor="ctr"/>
-                </a:tc>
-                <a:tc>
-                  <a:txBody>
-                    <a:bodyPr/>
-                    <a:lstStyle/>
-                    <a:p>
-                      <a:pPr algn="ctr"/>
-                      <a:r>
-                        <a:rPr lang="en-PH" dirty="0"/>
-                        <a:t>null</a:t>
-                      </a:r>
-                    </a:p>
-                  </a:txBody>
-                  <a:tcPr anchor="ctr"/>
-                </a:tc>
-                <a:tc>
-                  <a:txBody>
-                    <a:bodyPr/>
-                    <a:lstStyle/>
-                    <a:p>
-                      <a:pPr marL="0" marR="0" lvl="0" indent="0" algn="ctr" defTabSz="914400" rtl="0" eaLnBrk="1" fontAlgn="auto" latinLnBrk="0" hangingPunct="1">
-                        <a:lnSpc>
-                          <a:spcPct val="100000"/>
-                        </a:lnSpc>
-                        <a:spcBef>
-                          <a:spcPts val="0"/>
-                        </a:spcBef>
-                        <a:spcAft>
-                          <a:spcPts val="0"/>
-                        </a:spcAft>
-                        <a:buClrTx/>
-                        <a:buSzTx/>
-                        <a:buFontTx/>
-                        <a:buNone/>
-                        <a:tabLst/>
-                        <a:defRPr/>
-                      </a:pPr>
-                      <a:r>
-                        <a:rPr lang="en-PH" dirty="0"/>
-                        <a:t>2025-01-03</a:t>
-                      </a:r>
-                    </a:p>
-                  </a:txBody>
-                  <a:tcPr anchor="ctr"/>
-                </a:tc>
-                <a:extLst>
-                  <a:ext uri="{0D108BD9-81ED-4DB2-BD59-A6C34878D82A}">
-                    <a16:rowId xmlns:a16="http://schemas.microsoft.com/office/drawing/2014/main" val="2717289863"/>
-                  </a:ext>
-                </a:extLst>
-              </a:tr>
-            </a:tbl>
-          </a:graphicData>
-        </a:graphic>
-      </p:graphicFrame>
-      <p:graphicFrame>
-        <p:nvGraphicFramePr>
-          <p:cNvPr id="4" name="Table 3">
-            <a:extLst>
-              <a:ext uri="{FF2B5EF4-FFF2-40B4-BE49-F238E27FC236}">
-                <a16:creationId xmlns:a16="http://schemas.microsoft.com/office/drawing/2014/main" id="{544E8CEF-3922-836A-C342-94792F27D8DF}"/>
-              </a:ext>
-            </a:extLst>
-          </p:cNvPr>
-          <p:cNvGraphicFramePr>
-            <a:graphicFrameLocks noGrp="1"/>
-          </p:cNvGraphicFramePr>
-          <p:nvPr>
-            <p:extLst>
-              <p:ext uri="{D42A27DB-BD31-4B8C-83A1-F6EECF244321}">
-                <p14:modId xmlns:p14="http://schemas.microsoft.com/office/powerpoint/2010/main" val="2700943407"/>
-              </p:ext>
-            </p:extLst>
-          </p:nvPr>
-        </p:nvGraphicFramePr>
-        <p:xfrm>
-          <a:off x="5131039" y="4935346"/>
-          <a:ext cx="1929922" cy="833115"/>
-        </p:xfrm>
-        <a:graphic>
-          <a:graphicData uri="http://schemas.openxmlformats.org/drawingml/2006/table">
-            <a:tbl>
-              <a:tblPr firstRow="1" bandRow="1">
-                <a:tableStyleId>{5940675A-B579-460E-94D1-54222C63F5DA}</a:tableStyleId>
-              </a:tblPr>
-              <a:tblGrid>
-                <a:gridCol w="1929922">
-                  <a:extLst>
-                    <a:ext uri="{9D8B030D-6E8A-4147-A177-3AD203B41FA5}">
-                      <a16:colId xmlns:a16="http://schemas.microsoft.com/office/drawing/2014/main" val="3058387547"/>
-                    </a:ext>
-                  </a:extLst>
-                </a:gridCol>
-              </a:tblGrid>
-              <a:tr h="373155">
-                <a:tc>
-                  <a:txBody>
-                    <a:bodyPr/>
-                    <a:lstStyle/>
-                    <a:p>
-                      <a:pPr marL="0" marR="0" lvl="0" indent="0" algn="ctr" defTabSz="914400" rtl="0" eaLnBrk="1" fontAlgn="auto" latinLnBrk="0" hangingPunct="1">
-                        <a:lnSpc>
-                          <a:spcPct val="100000"/>
-                        </a:lnSpc>
-                        <a:spcBef>
-                          <a:spcPts val="0"/>
-                        </a:spcBef>
-                        <a:spcAft>
-                          <a:spcPts val="0"/>
-                        </a:spcAft>
-                        <a:buClrTx/>
-                        <a:buSzTx/>
-                        <a:buFontTx/>
-                        <a:buNone/>
-                        <a:tabLst/>
-                        <a:defRPr/>
-                      </a:pPr>
-                      <a:r>
-                        <a:rPr lang="en-PH" sz="1500" b="1" dirty="0"/>
-                        <a:t>sum</a:t>
-                      </a:r>
-                    </a:p>
-                  </a:txBody>
-                  <a:tcPr anchor="ctr">
-                    <a:solidFill>
-                      <a:schemeClr val="accent4">
-                        <a:lumMod val="40000"/>
-                        <a:lumOff val="60000"/>
-                      </a:schemeClr>
-                    </a:solidFill>
-                  </a:tcPr>
-                </a:tc>
-                <a:extLst>
-                  <a:ext uri="{0D108BD9-81ED-4DB2-BD59-A6C34878D82A}">
-                    <a16:rowId xmlns:a16="http://schemas.microsoft.com/office/drawing/2014/main" val="2556140539"/>
-                  </a:ext>
-                </a:extLst>
-              </a:tr>
-              <a:tr h="459960">
-                <a:tc>
-                  <a:txBody>
-                    <a:bodyPr/>
-                    <a:lstStyle/>
-                    <a:p>
-                      <a:pPr algn="ctr"/>
-                      <a:r>
-                        <a:rPr lang="en-PH" dirty="0"/>
-                        <a:t>17.25</a:t>
-                      </a:r>
-                    </a:p>
-                  </a:txBody>
-                  <a:tcPr anchor="ctr"/>
-                </a:tc>
-                <a:extLst>
-                  <a:ext uri="{0D108BD9-81ED-4DB2-BD59-A6C34878D82A}">
-                    <a16:rowId xmlns:a16="http://schemas.microsoft.com/office/drawing/2014/main" val="3326491140"/>
-                  </a:ext>
-                </a:extLst>
-              </a:tr>
-            </a:tbl>
-          </a:graphicData>
-        </a:graphic>
-      </p:graphicFrame>
-      <p:sp>
-        <p:nvSpPr>
-          <p:cNvPr id="5" name="Content Placeholder 2">
-            <a:extLst>
-              <a:ext uri="{FF2B5EF4-FFF2-40B4-BE49-F238E27FC236}">
-                <a16:creationId xmlns:a16="http://schemas.microsoft.com/office/drawing/2014/main" id="{8D3C2730-6420-39A3-A99D-D11E0B2399F6}"/>
-              </a:ext>
-            </a:extLst>
-          </p:cNvPr>
-          <p:cNvSpPr txBox="1">
-            <a:spLocks/>
-          </p:cNvSpPr>
-          <p:nvPr/>
-        </p:nvSpPr>
-        <p:spPr>
-          <a:xfrm>
-            <a:off x="5432920" y="4173275"/>
-            <a:ext cx="1326160" cy="489055"/>
-          </a:xfrm>
-          <a:prstGeom prst="rect">
-            <a:avLst/>
-          </a:prstGeom>
-        </p:spPr>
-        <p:txBody>
-          <a:bodyPr>
-            <a:normAutofit fontScale="92500"/>
-          </a:bodyPr>
-          <a:lstStyle>
-            <a:lvl1pPr marL="228600" indent="-228600" algn="l" defTabSz="914400" rtl="0" eaLnBrk="1" latinLnBrk="0" hangingPunct="1">
-              <a:lnSpc>
-                <a:spcPct val="90000"/>
-              </a:lnSpc>
-              <a:spcBef>
-                <a:spcPts val="1000"/>
-              </a:spcBef>
-              <a:buFont typeface="Arial" panose="020B0604020202020204" pitchFamily="34" charset="0"/>
-              <a:buChar char="•"/>
-              <a:defRPr sz="2800" kern="1200">
-                <a:solidFill>
-                  <a:schemeClr val="tx1"/>
-                </a:solidFill>
-                <a:latin typeface="+mn-lt"/>
-                <a:ea typeface="+mn-ea"/>
-                <a:cs typeface="+mn-cs"/>
-              </a:defRPr>
-            </a:lvl1pPr>
-            <a:lvl2pPr marL="685800" indent="-228600" algn="l" defTabSz="914400" rtl="0" eaLnBrk="1" latinLnBrk="0" hangingPunct="1">
-              <a:lnSpc>
-                <a:spcPct val="90000"/>
-              </a:lnSpc>
-              <a:spcBef>
-                <a:spcPts val="500"/>
-              </a:spcBef>
-              <a:buFont typeface="Arial" panose="020B0604020202020204" pitchFamily="34" charset="0"/>
-              <a:buChar char="•"/>
-              <a:defRPr sz="2400" kern="1200">
-                <a:solidFill>
-                  <a:schemeClr val="tx1"/>
-                </a:solidFill>
-                <a:latin typeface="+mn-lt"/>
-                <a:ea typeface="+mn-ea"/>
-                <a:cs typeface="+mn-cs"/>
-              </a:defRPr>
-            </a:lvl2pPr>
-            <a:lvl3pPr marL="1143000" indent="-228600" algn="l" defTabSz="914400" rtl="0" eaLnBrk="1" latinLnBrk="0" hangingPunct="1">
-              <a:lnSpc>
-                <a:spcPct val="90000"/>
-              </a:lnSpc>
-              <a:spcBef>
-                <a:spcPts val="500"/>
-              </a:spcBef>
-              <a:buFont typeface="Arial" panose="020B0604020202020204" pitchFamily="34" charset="0"/>
-              <a:buChar char="•"/>
-              <a:defRPr sz="2000" kern="1200">
-                <a:solidFill>
-                  <a:schemeClr val="tx1"/>
-                </a:solidFill>
-                <a:latin typeface="+mn-lt"/>
-                <a:ea typeface="+mn-ea"/>
-                <a:cs typeface="+mn-cs"/>
-              </a:defRPr>
-            </a:lvl3pPr>
-            <a:lvl4pPr marL="1600200" indent="-228600" algn="l" defTabSz="914400" rtl="0" eaLnBrk="1" latinLnBrk="0" hangingPunct="1">
-              <a:lnSpc>
-                <a:spcPct val="90000"/>
-              </a:lnSpc>
-              <a:spcBef>
-                <a:spcPts val="500"/>
-              </a:spcBef>
-              <a:buFont typeface="Arial" panose="020B0604020202020204" pitchFamily="34" charset="0"/>
-              <a:buChar char="•"/>
-              <a:defRPr sz="1800" kern="1200">
-                <a:solidFill>
-                  <a:schemeClr val="tx1"/>
-                </a:solidFill>
-                <a:latin typeface="+mn-lt"/>
-                <a:ea typeface="+mn-ea"/>
-                <a:cs typeface="+mn-cs"/>
-              </a:defRPr>
-            </a:lvl4pPr>
-            <a:lvl5pPr marL="2057400" indent="-228600" algn="l" defTabSz="914400" rtl="0" eaLnBrk="1" latinLnBrk="0" hangingPunct="1">
-              <a:lnSpc>
-                <a:spcPct val="90000"/>
-              </a:lnSpc>
-              <a:spcBef>
-                <a:spcPts val="500"/>
-              </a:spcBef>
-              <a:buFont typeface="Arial" panose="020B0604020202020204" pitchFamily="34" charset="0"/>
-              <a:buChar char="•"/>
-              <a:defRPr sz="1800" kern="1200">
-                <a:solidFill>
-                  <a:schemeClr val="tx1"/>
-                </a:solidFill>
-                <a:latin typeface="+mn-lt"/>
-                <a:ea typeface="+mn-ea"/>
-                <a:cs typeface="+mn-cs"/>
-              </a:defRPr>
-            </a:lvl5pPr>
-            <a:lvl6pPr marL="2514600" indent="-228600" algn="l" defTabSz="914400" rtl="0" eaLnBrk="1" latinLnBrk="0" hangingPunct="1">
-              <a:lnSpc>
-                <a:spcPct val="90000"/>
-              </a:lnSpc>
-              <a:spcBef>
-                <a:spcPts val="500"/>
-              </a:spcBef>
-              <a:buFont typeface="Arial" panose="020B0604020202020204" pitchFamily="34" charset="0"/>
-              <a:buChar char="•"/>
-              <a:defRPr sz="1800" kern="1200">
-                <a:solidFill>
-                  <a:schemeClr val="tx1"/>
-                </a:solidFill>
-                <a:latin typeface="+mn-lt"/>
-                <a:ea typeface="+mn-ea"/>
-                <a:cs typeface="+mn-cs"/>
-              </a:defRPr>
-            </a:lvl6pPr>
-            <a:lvl7pPr marL="2971800" indent="-228600" algn="l" defTabSz="914400" rtl="0" eaLnBrk="1" latinLnBrk="0" hangingPunct="1">
-              <a:lnSpc>
-                <a:spcPct val="90000"/>
-              </a:lnSpc>
-              <a:spcBef>
-                <a:spcPts val="500"/>
-              </a:spcBef>
-              <a:buFont typeface="Arial" panose="020B0604020202020204" pitchFamily="34" charset="0"/>
-              <a:buChar char="•"/>
-              <a:defRPr sz="1800" kern="1200">
-                <a:solidFill>
-                  <a:schemeClr val="tx1"/>
-                </a:solidFill>
-                <a:latin typeface="+mn-lt"/>
-                <a:ea typeface="+mn-ea"/>
-                <a:cs typeface="+mn-cs"/>
-              </a:defRPr>
-            </a:lvl7pPr>
-            <a:lvl8pPr marL="3429000" indent="-228600" algn="l" defTabSz="914400" rtl="0" eaLnBrk="1" latinLnBrk="0" hangingPunct="1">
-              <a:lnSpc>
-                <a:spcPct val="90000"/>
-              </a:lnSpc>
-              <a:spcBef>
-                <a:spcPts val="500"/>
-              </a:spcBef>
-              <a:buFont typeface="Arial" panose="020B0604020202020204" pitchFamily="34" charset="0"/>
-              <a:buChar char="•"/>
-              <a:defRPr sz="1800" kern="1200">
-                <a:solidFill>
-                  <a:schemeClr val="tx1"/>
-                </a:solidFill>
-                <a:latin typeface="+mn-lt"/>
-                <a:ea typeface="+mn-ea"/>
-                <a:cs typeface="+mn-cs"/>
-              </a:defRPr>
-            </a:lvl8pPr>
-            <a:lvl9pPr marL="3886200" indent="-228600" algn="l" defTabSz="914400" rtl="0" eaLnBrk="1" latinLnBrk="0" hangingPunct="1">
-              <a:lnSpc>
-                <a:spcPct val="90000"/>
-              </a:lnSpc>
-              <a:spcBef>
-                <a:spcPts val="500"/>
-              </a:spcBef>
-              <a:buFont typeface="Arial" panose="020B0604020202020204" pitchFamily="34" charset="0"/>
-              <a:buChar char="•"/>
-              <a:defRPr sz="1800" kern="1200">
-                <a:solidFill>
-                  <a:schemeClr val="tx1"/>
-                </a:solidFill>
-                <a:latin typeface="+mn-lt"/>
-                <a:ea typeface="+mn-ea"/>
-                <a:cs typeface="+mn-cs"/>
-              </a:defRPr>
-            </a:lvl9pPr>
-          </a:lstStyle>
-          <a:p>
-            <a:pPr marL="0" indent="0">
-              <a:buFont typeface="Arial" panose="020B0604020202020204" pitchFamily="34" charset="0"/>
-              <a:buNone/>
-            </a:pPr>
-            <a:r>
-              <a:rPr lang="en-PH" sz="3000" dirty="0"/>
-              <a:t>Result:</a:t>
-            </a:r>
-          </a:p>
-        </p:txBody>
-      </p:sp>
-      <p:pic>
-        <p:nvPicPr>
-          <p:cNvPr id="6" name="Picture 5" descr="A black rectangular with yellow green and blue text&#10;&#10;AI-generated content may be incorrect.">
-            <a:extLst>
-              <a:ext uri="{FF2B5EF4-FFF2-40B4-BE49-F238E27FC236}">
-                <a16:creationId xmlns:a16="http://schemas.microsoft.com/office/drawing/2014/main" id="{8F93E651-CD3D-9D0C-767A-35E3117070A6}"/>
-              </a:ext>
-            </a:extLst>
-          </p:cNvPr>
-          <p:cNvPicPr>
-            <a:picLocks noChangeAspect="1"/>
-          </p:cNvPicPr>
-          <p:nvPr/>
-        </p:nvPicPr>
-        <p:blipFill>
-          <a:blip r:embed="rId2"/>
-          <a:stretch>
-            <a:fillRect/>
-          </a:stretch>
-        </p:blipFill>
-        <p:spPr>
-          <a:xfrm>
-            <a:off x="6377163" y="366671"/>
-            <a:ext cx="5321739" cy="2880000"/>
-          </a:xfrm>
-          <a:prstGeom prst="rect">
-            <a:avLst/>
-          </a:prstGeom>
-        </p:spPr>
-      </p:pic>
-    </p:spTree>
-    <p:extLst>
-      <p:ext uri="{BB962C8B-B14F-4D97-AF65-F5344CB8AC3E}">
-        <p14:creationId xmlns:p14="http://schemas.microsoft.com/office/powerpoint/2010/main" val="253191522"/>
       </p:ext>
     </p:extLst>
   </p:cSld>

</xml_diff>